<commit_message>
Update BIoPhot GUI for Basler Camera
</commit_message>
<xml_diff>
--- a/BioPhot/Guide Utilisateur Interface.pptx
+++ b/BioPhot/Guide Utilisateur Interface.pptx
@@ -133,6 +133,22 @@
       </a:defRPr>
     </a:lvl9pPr>
   </p:defaultTextStyle>
+  <p:extLst>
+    <p:ext uri="{EFAFB233-063F-42B5-8137-9DF3F51BA10A}">
+      <p15:sldGuideLst xmlns:p15="http://schemas.microsoft.com/office/powerpoint/2012/main">
+        <p15:guide id="1" orient="horz" pos="2160">
+          <p15:clr>
+            <a:srgbClr val="A4A3A4"/>
+          </p15:clr>
+        </p15:guide>
+        <p15:guide id="2" pos="2880">
+          <p15:clr>
+            <a:srgbClr val="A4A3A4"/>
+          </p15:clr>
+        </p15:guide>
+      </p15:sldGuideLst>
+    </p:ext>
+  </p:extLst>
 </p:presentation>
 </file>
 
@@ -174,10 +190,9 @@
           <a:lstStyle/>
           <a:p>
             <a:r>
-              <a:rPr lang="fr-FR" smtClean="0"/>
+              <a:rPr lang="fr-FR"/>
               <a:t>Modifiez le style du titre</a:t>
             </a:r>
-            <a:endParaRPr lang="fr-FR"/>
           </a:p>
         </p:txBody>
       </p:sp>
@@ -293,10 +308,9 @@
           </a:lstStyle>
           <a:p>
             <a:r>
-              <a:rPr lang="fr-FR" smtClean="0"/>
+              <a:rPr lang="fr-FR"/>
               <a:t>Modifiez le style des sous-titres du masque</a:t>
             </a:r>
-            <a:endParaRPr lang="fr-FR"/>
           </a:p>
         </p:txBody>
       </p:sp>
@@ -317,7 +331,7 @@
           <a:p>
             <a:fld id="{F05AD8E0-B723-463E-9F77-7E6F91568C17}" type="datetimeFigureOut">
               <a:rPr lang="fr-FR" smtClean="0"/>
-              <a:t>18/07/2023</a:t>
+              <a:t>17/07/2023</a:t>
             </a:fld>
             <a:endParaRPr lang="fr-FR"/>
           </a:p>
@@ -411,10 +425,9 @@
           <a:lstStyle/>
           <a:p>
             <a:r>
-              <a:rPr lang="fr-FR" smtClean="0"/>
+              <a:rPr lang="fr-FR"/>
               <a:t>Modifiez le style du titre</a:t>
             </a:r>
-            <a:endParaRPr lang="fr-FR"/>
           </a:p>
         </p:txBody>
       </p:sp>
@@ -435,38 +448,37 @@
           <a:p>
             <a:pPr lvl="0"/>
             <a:r>
-              <a:rPr lang="fr-FR" smtClean="0"/>
+              <a:rPr lang="fr-FR"/>
               <a:t>Modifiez les styles du texte du masque</a:t>
             </a:r>
           </a:p>
           <a:p>
             <a:pPr lvl="1"/>
             <a:r>
-              <a:rPr lang="fr-FR" smtClean="0"/>
+              <a:rPr lang="fr-FR"/>
               <a:t>Deuxième niveau</a:t>
             </a:r>
           </a:p>
           <a:p>
             <a:pPr lvl="2"/>
             <a:r>
-              <a:rPr lang="fr-FR" smtClean="0"/>
+              <a:rPr lang="fr-FR"/>
               <a:t>Troisième niveau</a:t>
             </a:r>
           </a:p>
           <a:p>
             <a:pPr lvl="3"/>
             <a:r>
-              <a:rPr lang="fr-FR" smtClean="0"/>
+              <a:rPr lang="fr-FR"/>
               <a:t>Quatrième niveau</a:t>
             </a:r>
           </a:p>
           <a:p>
             <a:pPr lvl="4"/>
             <a:r>
-              <a:rPr lang="fr-FR" smtClean="0"/>
+              <a:rPr lang="fr-FR"/>
               <a:t>Cinquième niveau</a:t>
             </a:r>
-            <a:endParaRPr lang="fr-FR"/>
           </a:p>
         </p:txBody>
       </p:sp>
@@ -487,7 +499,7 @@
           <a:p>
             <a:fld id="{F05AD8E0-B723-463E-9F77-7E6F91568C17}" type="datetimeFigureOut">
               <a:rPr lang="fr-FR" smtClean="0"/>
-              <a:t>18/07/2023</a:t>
+              <a:t>17/07/2023</a:t>
             </a:fld>
             <a:endParaRPr lang="fr-FR"/>
           </a:p>
@@ -586,10 +598,9 @@
           <a:lstStyle/>
           <a:p>
             <a:r>
-              <a:rPr lang="fr-FR" smtClean="0"/>
+              <a:rPr lang="fr-FR"/>
               <a:t>Modifiez le style du titre</a:t>
             </a:r>
-            <a:endParaRPr lang="fr-FR"/>
           </a:p>
         </p:txBody>
       </p:sp>
@@ -615,38 +626,37 @@
           <a:p>
             <a:pPr lvl="0"/>
             <a:r>
-              <a:rPr lang="fr-FR" smtClean="0"/>
+              <a:rPr lang="fr-FR"/>
               <a:t>Modifiez les styles du texte du masque</a:t>
             </a:r>
           </a:p>
           <a:p>
             <a:pPr lvl="1"/>
             <a:r>
-              <a:rPr lang="fr-FR" smtClean="0"/>
+              <a:rPr lang="fr-FR"/>
               <a:t>Deuxième niveau</a:t>
             </a:r>
           </a:p>
           <a:p>
             <a:pPr lvl="2"/>
             <a:r>
-              <a:rPr lang="fr-FR" smtClean="0"/>
+              <a:rPr lang="fr-FR"/>
               <a:t>Troisième niveau</a:t>
             </a:r>
           </a:p>
           <a:p>
             <a:pPr lvl="3"/>
             <a:r>
-              <a:rPr lang="fr-FR" smtClean="0"/>
+              <a:rPr lang="fr-FR"/>
               <a:t>Quatrième niveau</a:t>
             </a:r>
           </a:p>
           <a:p>
             <a:pPr lvl="4"/>
             <a:r>
-              <a:rPr lang="fr-FR" smtClean="0"/>
+              <a:rPr lang="fr-FR"/>
               <a:t>Cinquième niveau</a:t>
             </a:r>
-            <a:endParaRPr lang="fr-FR"/>
           </a:p>
         </p:txBody>
       </p:sp>
@@ -667,7 +677,7 @@
           <a:p>
             <a:fld id="{F05AD8E0-B723-463E-9F77-7E6F91568C17}" type="datetimeFigureOut">
               <a:rPr lang="fr-FR" smtClean="0"/>
-              <a:t>18/07/2023</a:t>
+              <a:t>17/07/2023</a:t>
             </a:fld>
             <a:endParaRPr lang="fr-FR"/>
           </a:p>
@@ -761,10 +771,9 @@
           <a:lstStyle/>
           <a:p>
             <a:r>
-              <a:rPr lang="fr-FR" smtClean="0"/>
+              <a:rPr lang="fr-FR"/>
               <a:t>Modifiez le style du titre</a:t>
             </a:r>
-            <a:endParaRPr lang="fr-FR"/>
           </a:p>
         </p:txBody>
       </p:sp>
@@ -785,38 +794,37 @@
           <a:p>
             <a:pPr lvl="0"/>
             <a:r>
-              <a:rPr lang="fr-FR" smtClean="0"/>
+              <a:rPr lang="fr-FR"/>
               <a:t>Modifiez les styles du texte du masque</a:t>
             </a:r>
           </a:p>
           <a:p>
             <a:pPr lvl="1"/>
             <a:r>
-              <a:rPr lang="fr-FR" smtClean="0"/>
+              <a:rPr lang="fr-FR"/>
               <a:t>Deuxième niveau</a:t>
             </a:r>
           </a:p>
           <a:p>
             <a:pPr lvl="2"/>
             <a:r>
-              <a:rPr lang="fr-FR" smtClean="0"/>
+              <a:rPr lang="fr-FR"/>
               <a:t>Troisième niveau</a:t>
             </a:r>
           </a:p>
           <a:p>
             <a:pPr lvl="3"/>
             <a:r>
-              <a:rPr lang="fr-FR" smtClean="0"/>
+              <a:rPr lang="fr-FR"/>
               <a:t>Quatrième niveau</a:t>
             </a:r>
           </a:p>
           <a:p>
             <a:pPr lvl="4"/>
             <a:r>
-              <a:rPr lang="fr-FR" smtClean="0"/>
+              <a:rPr lang="fr-FR"/>
               <a:t>Cinquième niveau</a:t>
             </a:r>
-            <a:endParaRPr lang="fr-FR"/>
           </a:p>
         </p:txBody>
       </p:sp>
@@ -837,7 +845,7 @@
           <a:p>
             <a:fld id="{F05AD8E0-B723-463E-9F77-7E6F91568C17}" type="datetimeFigureOut">
               <a:rPr lang="fr-FR" smtClean="0"/>
-              <a:t>18/07/2023</a:t>
+              <a:t>17/07/2023</a:t>
             </a:fld>
             <a:endParaRPr lang="fr-FR"/>
           </a:p>
@@ -940,10 +948,9 @@
           </a:lstStyle>
           <a:p>
             <a:r>
-              <a:rPr lang="fr-FR" smtClean="0"/>
+              <a:rPr lang="fr-FR"/>
               <a:t>Modifiez le style du titre</a:t>
             </a:r>
-            <a:endParaRPr lang="fr-FR"/>
           </a:p>
         </p:txBody>
       </p:sp>
@@ -1060,7 +1067,7 @@
           <a:p>
             <a:pPr lvl="0"/>
             <a:r>
-              <a:rPr lang="fr-FR" smtClean="0"/>
+              <a:rPr lang="fr-FR"/>
               <a:t>Modifiez les styles du texte du masque</a:t>
             </a:r>
           </a:p>
@@ -1083,7 +1090,7 @@
           <a:p>
             <a:fld id="{F05AD8E0-B723-463E-9F77-7E6F91568C17}" type="datetimeFigureOut">
               <a:rPr lang="fr-FR" smtClean="0"/>
-              <a:t>18/07/2023</a:t>
+              <a:t>17/07/2023</a:t>
             </a:fld>
             <a:endParaRPr lang="fr-FR"/>
           </a:p>
@@ -1177,10 +1184,9 @@
           <a:lstStyle/>
           <a:p>
             <a:r>
-              <a:rPr lang="fr-FR" smtClean="0"/>
+              <a:rPr lang="fr-FR"/>
               <a:t>Modifiez le style du titre</a:t>
             </a:r>
-            <a:endParaRPr lang="fr-FR"/>
           </a:p>
         </p:txBody>
       </p:sp>
@@ -1234,38 +1240,37 @@
           <a:p>
             <a:pPr lvl="0"/>
             <a:r>
-              <a:rPr lang="fr-FR" smtClean="0"/>
+              <a:rPr lang="fr-FR"/>
               <a:t>Modifiez les styles du texte du masque</a:t>
             </a:r>
           </a:p>
           <a:p>
             <a:pPr lvl="1"/>
             <a:r>
-              <a:rPr lang="fr-FR" smtClean="0"/>
+              <a:rPr lang="fr-FR"/>
               <a:t>Deuxième niveau</a:t>
             </a:r>
           </a:p>
           <a:p>
             <a:pPr lvl="2"/>
             <a:r>
-              <a:rPr lang="fr-FR" smtClean="0"/>
+              <a:rPr lang="fr-FR"/>
               <a:t>Troisième niveau</a:t>
             </a:r>
           </a:p>
           <a:p>
             <a:pPr lvl="3"/>
             <a:r>
-              <a:rPr lang="fr-FR" smtClean="0"/>
+              <a:rPr lang="fr-FR"/>
               <a:t>Quatrième niveau</a:t>
             </a:r>
           </a:p>
           <a:p>
             <a:pPr lvl="4"/>
             <a:r>
-              <a:rPr lang="fr-FR" smtClean="0"/>
+              <a:rPr lang="fr-FR"/>
               <a:t>Cinquième niveau</a:t>
             </a:r>
-            <a:endParaRPr lang="fr-FR"/>
           </a:p>
         </p:txBody>
       </p:sp>
@@ -1319,38 +1324,37 @@
           <a:p>
             <a:pPr lvl="0"/>
             <a:r>
-              <a:rPr lang="fr-FR" smtClean="0"/>
+              <a:rPr lang="fr-FR"/>
               <a:t>Modifiez les styles du texte du masque</a:t>
             </a:r>
           </a:p>
           <a:p>
             <a:pPr lvl="1"/>
             <a:r>
-              <a:rPr lang="fr-FR" smtClean="0"/>
+              <a:rPr lang="fr-FR"/>
               <a:t>Deuxième niveau</a:t>
             </a:r>
           </a:p>
           <a:p>
             <a:pPr lvl="2"/>
             <a:r>
-              <a:rPr lang="fr-FR" smtClean="0"/>
+              <a:rPr lang="fr-FR"/>
               <a:t>Troisième niveau</a:t>
             </a:r>
           </a:p>
           <a:p>
             <a:pPr lvl="3"/>
             <a:r>
-              <a:rPr lang="fr-FR" smtClean="0"/>
+              <a:rPr lang="fr-FR"/>
               <a:t>Quatrième niveau</a:t>
             </a:r>
           </a:p>
           <a:p>
             <a:pPr lvl="4"/>
             <a:r>
-              <a:rPr lang="fr-FR" smtClean="0"/>
+              <a:rPr lang="fr-FR"/>
               <a:t>Cinquième niveau</a:t>
             </a:r>
-            <a:endParaRPr lang="fr-FR"/>
           </a:p>
         </p:txBody>
       </p:sp>
@@ -1371,7 +1375,7 @@
           <a:p>
             <a:fld id="{F05AD8E0-B723-463E-9F77-7E6F91568C17}" type="datetimeFigureOut">
               <a:rPr lang="fr-FR" smtClean="0"/>
-              <a:t>18/07/2023</a:t>
+              <a:t>17/07/2023</a:t>
             </a:fld>
             <a:endParaRPr lang="fr-FR"/>
           </a:p>
@@ -1469,10 +1473,9 @@
           </a:lstStyle>
           <a:p>
             <a:r>
-              <a:rPr lang="fr-FR" smtClean="0"/>
+              <a:rPr lang="fr-FR"/>
               <a:t>Modifiez le style du titre</a:t>
             </a:r>
-            <a:endParaRPr lang="fr-FR"/>
           </a:p>
         </p:txBody>
       </p:sp>
@@ -1535,7 +1538,7 @@
           <a:p>
             <a:pPr lvl="0"/>
             <a:r>
-              <a:rPr lang="fr-FR" smtClean="0"/>
+              <a:rPr lang="fr-FR"/>
               <a:t>Modifiez les styles du texte du masque</a:t>
             </a:r>
           </a:p>
@@ -1591,38 +1594,37 @@
           <a:p>
             <a:pPr lvl="0"/>
             <a:r>
-              <a:rPr lang="fr-FR" smtClean="0"/>
+              <a:rPr lang="fr-FR"/>
               <a:t>Modifiez les styles du texte du masque</a:t>
             </a:r>
           </a:p>
           <a:p>
             <a:pPr lvl="1"/>
             <a:r>
-              <a:rPr lang="fr-FR" smtClean="0"/>
+              <a:rPr lang="fr-FR"/>
               <a:t>Deuxième niveau</a:t>
             </a:r>
           </a:p>
           <a:p>
             <a:pPr lvl="2"/>
             <a:r>
-              <a:rPr lang="fr-FR" smtClean="0"/>
+              <a:rPr lang="fr-FR"/>
               <a:t>Troisième niveau</a:t>
             </a:r>
           </a:p>
           <a:p>
             <a:pPr lvl="3"/>
             <a:r>
-              <a:rPr lang="fr-FR" smtClean="0"/>
+              <a:rPr lang="fr-FR"/>
               <a:t>Quatrième niveau</a:t>
             </a:r>
           </a:p>
           <a:p>
             <a:pPr lvl="4"/>
             <a:r>
-              <a:rPr lang="fr-FR" smtClean="0"/>
+              <a:rPr lang="fr-FR"/>
               <a:t>Cinquième niveau</a:t>
             </a:r>
-            <a:endParaRPr lang="fr-FR"/>
           </a:p>
         </p:txBody>
       </p:sp>
@@ -1685,7 +1687,7 @@
           <a:p>
             <a:pPr lvl="0"/>
             <a:r>
-              <a:rPr lang="fr-FR" smtClean="0"/>
+              <a:rPr lang="fr-FR"/>
               <a:t>Modifiez les styles du texte du masque</a:t>
             </a:r>
           </a:p>
@@ -1741,38 +1743,37 @@
           <a:p>
             <a:pPr lvl="0"/>
             <a:r>
-              <a:rPr lang="fr-FR" smtClean="0"/>
+              <a:rPr lang="fr-FR"/>
               <a:t>Modifiez les styles du texte du masque</a:t>
             </a:r>
           </a:p>
           <a:p>
             <a:pPr lvl="1"/>
             <a:r>
-              <a:rPr lang="fr-FR" smtClean="0"/>
+              <a:rPr lang="fr-FR"/>
               <a:t>Deuxième niveau</a:t>
             </a:r>
           </a:p>
           <a:p>
             <a:pPr lvl="2"/>
             <a:r>
-              <a:rPr lang="fr-FR" smtClean="0"/>
+              <a:rPr lang="fr-FR"/>
               <a:t>Troisième niveau</a:t>
             </a:r>
           </a:p>
           <a:p>
             <a:pPr lvl="3"/>
             <a:r>
-              <a:rPr lang="fr-FR" smtClean="0"/>
+              <a:rPr lang="fr-FR"/>
               <a:t>Quatrième niveau</a:t>
             </a:r>
           </a:p>
           <a:p>
             <a:pPr lvl="4"/>
             <a:r>
-              <a:rPr lang="fr-FR" smtClean="0"/>
+              <a:rPr lang="fr-FR"/>
               <a:t>Cinquième niveau</a:t>
             </a:r>
-            <a:endParaRPr lang="fr-FR"/>
           </a:p>
         </p:txBody>
       </p:sp>
@@ -1793,7 +1794,7 @@
           <a:p>
             <a:fld id="{F05AD8E0-B723-463E-9F77-7E6F91568C17}" type="datetimeFigureOut">
               <a:rPr lang="fr-FR" smtClean="0"/>
-              <a:t>18/07/2023</a:t>
+              <a:t>17/07/2023</a:t>
             </a:fld>
             <a:endParaRPr lang="fr-FR"/>
           </a:p>
@@ -1887,10 +1888,9 @@
           <a:lstStyle/>
           <a:p>
             <a:r>
-              <a:rPr lang="fr-FR" smtClean="0"/>
+              <a:rPr lang="fr-FR"/>
               <a:t>Modifiez le style du titre</a:t>
             </a:r>
-            <a:endParaRPr lang="fr-FR"/>
           </a:p>
         </p:txBody>
       </p:sp>
@@ -1911,7 +1911,7 @@
           <a:p>
             <a:fld id="{F05AD8E0-B723-463E-9F77-7E6F91568C17}" type="datetimeFigureOut">
               <a:rPr lang="fr-FR" smtClean="0"/>
-              <a:t>18/07/2023</a:t>
+              <a:t>17/07/2023</a:t>
             </a:fld>
             <a:endParaRPr lang="fr-FR"/>
           </a:p>
@@ -2006,7 +2006,7 @@
           <a:p>
             <a:fld id="{F05AD8E0-B723-463E-9F77-7E6F91568C17}" type="datetimeFigureOut">
               <a:rPr lang="fr-FR" smtClean="0"/>
-              <a:t>18/07/2023</a:t>
+              <a:t>17/07/2023</a:t>
             </a:fld>
             <a:endParaRPr lang="fr-FR"/>
           </a:p>
@@ -2109,10 +2109,9 @@
           </a:lstStyle>
           <a:p>
             <a:r>
-              <a:rPr lang="fr-FR" smtClean="0"/>
+              <a:rPr lang="fr-FR"/>
               <a:t>Modifiez le style du titre</a:t>
             </a:r>
-            <a:endParaRPr lang="fr-FR"/>
           </a:p>
         </p:txBody>
       </p:sp>
@@ -2166,38 +2165,37 @@
           <a:p>
             <a:pPr lvl="0"/>
             <a:r>
-              <a:rPr lang="fr-FR" smtClean="0"/>
+              <a:rPr lang="fr-FR"/>
               <a:t>Modifiez les styles du texte du masque</a:t>
             </a:r>
           </a:p>
           <a:p>
             <a:pPr lvl="1"/>
             <a:r>
-              <a:rPr lang="fr-FR" smtClean="0"/>
+              <a:rPr lang="fr-FR"/>
               <a:t>Deuxième niveau</a:t>
             </a:r>
           </a:p>
           <a:p>
             <a:pPr lvl="2"/>
             <a:r>
-              <a:rPr lang="fr-FR" smtClean="0"/>
+              <a:rPr lang="fr-FR"/>
               <a:t>Troisième niveau</a:t>
             </a:r>
           </a:p>
           <a:p>
             <a:pPr lvl="3"/>
             <a:r>
-              <a:rPr lang="fr-FR" smtClean="0"/>
+              <a:rPr lang="fr-FR"/>
               <a:t>Quatrième niveau</a:t>
             </a:r>
           </a:p>
           <a:p>
             <a:pPr lvl="4"/>
             <a:r>
-              <a:rPr lang="fr-FR" smtClean="0"/>
+              <a:rPr lang="fr-FR"/>
               <a:t>Cinquième niveau</a:t>
             </a:r>
-            <a:endParaRPr lang="fr-FR"/>
           </a:p>
         </p:txBody>
       </p:sp>
@@ -2260,7 +2258,7 @@
           <a:p>
             <a:pPr lvl="0"/>
             <a:r>
-              <a:rPr lang="fr-FR" smtClean="0"/>
+              <a:rPr lang="fr-FR"/>
               <a:t>Modifiez les styles du texte du masque</a:t>
             </a:r>
           </a:p>
@@ -2283,7 +2281,7 @@
           <a:p>
             <a:fld id="{F05AD8E0-B723-463E-9F77-7E6F91568C17}" type="datetimeFigureOut">
               <a:rPr lang="fr-FR" smtClean="0"/>
-              <a:t>18/07/2023</a:t>
+              <a:t>17/07/2023</a:t>
             </a:fld>
             <a:endParaRPr lang="fr-FR"/>
           </a:p>
@@ -2386,10 +2384,9 @@
           </a:lstStyle>
           <a:p>
             <a:r>
-              <a:rPr lang="fr-FR" smtClean="0"/>
+              <a:rPr lang="fr-FR"/>
               <a:t>Modifiez le style du titre</a:t>
             </a:r>
-            <a:endParaRPr lang="fr-FR"/>
           </a:p>
         </p:txBody>
       </p:sp>
@@ -2513,7 +2510,7 @@
           <a:p>
             <a:pPr lvl="0"/>
             <a:r>
-              <a:rPr lang="fr-FR" smtClean="0"/>
+              <a:rPr lang="fr-FR"/>
               <a:t>Modifiez les styles du texte du masque</a:t>
             </a:r>
           </a:p>
@@ -2536,7 +2533,7 @@
           <a:p>
             <a:fld id="{F05AD8E0-B723-463E-9F77-7E6F91568C17}" type="datetimeFigureOut">
               <a:rPr lang="fr-FR" smtClean="0"/>
-              <a:t>18/07/2023</a:t>
+              <a:t>17/07/2023</a:t>
             </a:fld>
             <a:endParaRPr lang="fr-FR"/>
           </a:p>
@@ -2645,10 +2642,9 @@
           <a:lstStyle/>
           <a:p>
             <a:r>
-              <a:rPr lang="fr-FR" smtClean="0"/>
+              <a:rPr lang="fr-FR"/>
               <a:t>Modifiez le style du titre</a:t>
             </a:r>
-            <a:endParaRPr lang="fr-FR"/>
           </a:p>
         </p:txBody>
       </p:sp>
@@ -2679,38 +2675,37 @@
           <a:p>
             <a:pPr lvl="0"/>
             <a:r>
-              <a:rPr lang="fr-FR" smtClean="0"/>
+              <a:rPr lang="fr-FR"/>
               <a:t>Modifiez les styles du texte du masque</a:t>
             </a:r>
           </a:p>
           <a:p>
             <a:pPr lvl="1"/>
             <a:r>
-              <a:rPr lang="fr-FR" smtClean="0"/>
+              <a:rPr lang="fr-FR"/>
               <a:t>Deuxième niveau</a:t>
             </a:r>
           </a:p>
           <a:p>
             <a:pPr lvl="2"/>
             <a:r>
-              <a:rPr lang="fr-FR" smtClean="0"/>
+              <a:rPr lang="fr-FR"/>
               <a:t>Troisième niveau</a:t>
             </a:r>
           </a:p>
           <a:p>
             <a:pPr lvl="3"/>
             <a:r>
-              <a:rPr lang="fr-FR" smtClean="0"/>
+              <a:rPr lang="fr-FR"/>
               <a:t>Quatrième niveau</a:t>
             </a:r>
           </a:p>
           <a:p>
             <a:pPr lvl="4"/>
             <a:r>
-              <a:rPr lang="fr-FR" smtClean="0"/>
+              <a:rPr lang="fr-FR"/>
               <a:t>Cinquième niveau</a:t>
             </a:r>
-            <a:endParaRPr lang="fr-FR"/>
           </a:p>
         </p:txBody>
       </p:sp>
@@ -2749,7 +2744,7 @@
           <a:p>
             <a:fld id="{F05AD8E0-B723-463E-9F77-7E6F91568C17}" type="datetimeFigureOut">
               <a:rPr lang="fr-FR" smtClean="0"/>
-              <a:t>18/07/2023</a:t>
+              <a:t>17/07/2023</a:t>
             </a:fld>
             <a:endParaRPr lang="fr-FR"/>
           </a:p>
@@ -3147,10 +3142,9 @@
           <a:lstStyle/>
           <a:p>
             <a:r>
-              <a:rPr lang="fr-FR" sz="3200" dirty="0" smtClean="0"/>
+              <a:rPr lang="fr-FR" sz="3200" dirty="0"/>
               <a:t>Guide Utilisateur Interface</a:t>
             </a:r>
-            <a:endParaRPr lang="fr-FR" sz="3200" dirty="0"/>
           </a:p>
         </p:txBody>
       </p:sp>
@@ -3249,7 +3243,7 @@
           <a:p>
             <a:pPr algn="ctr"/>
             <a:r>
-              <a:rPr lang="fr-FR" sz="2000" b="1" dirty="0" smtClean="0">
+              <a:rPr lang="fr-FR" sz="2000" b="1" dirty="0">
                 <a:solidFill>
                   <a:schemeClr val="tx1">
                     <a:lumMod val="65000"/>
@@ -3259,14 +3253,6 @@
               </a:rPr>
               <a:t>Microscope à Illumination Structurée</a:t>
             </a:r>
-            <a:endParaRPr lang="fr-FR" sz="2000" b="1" dirty="0">
-              <a:solidFill>
-                <a:schemeClr val="tx1">
-                  <a:lumMod val="65000"/>
-                  <a:lumOff val="35000"/>
-                </a:schemeClr>
-              </a:solidFill>
-            </a:endParaRPr>
           </a:p>
         </p:txBody>
       </p:sp>
@@ -3329,7 +3315,7 @@
           <a:p>
             <a:pPr algn="ctr"/>
             <a:r>
-              <a:rPr lang="fr-FR" sz="1100" dirty="0" smtClean="0">
+              <a:rPr lang="fr-FR" sz="1100" dirty="0">
                 <a:solidFill>
                   <a:schemeClr val="tx1">
                     <a:lumMod val="65000"/>
@@ -3339,14 +3325,6 @@
               </a:rPr>
               <a:t>Interface réalisée par Romain Etienne / Promo 2025 – juin 2023</a:t>
             </a:r>
-            <a:endParaRPr lang="fr-FR" sz="1100" dirty="0">
-              <a:solidFill>
-                <a:schemeClr val="tx1">
-                  <a:lumMod val="65000"/>
-                  <a:lumOff val="35000"/>
-                </a:schemeClr>
-              </a:solidFill>
-            </a:endParaRPr>
           </a:p>
         </p:txBody>
       </p:sp>
@@ -3396,22 +3374,21 @@
           <a:lstStyle/>
           <a:p>
             <a:r>
-              <a:rPr lang="fr-FR" dirty="0" smtClean="0"/>
+              <a:rPr lang="fr-FR" dirty="0"/>
               <a:t>Sert à voir la caméra</a:t>
             </a:r>
           </a:p>
           <a:p>
             <a:r>
-              <a:rPr lang="fr-FR" dirty="0" smtClean="0"/>
+              <a:rPr lang="fr-FR" dirty="0"/>
               <a:t>Peut être ralentie pendant l’acquisition automatique</a:t>
             </a:r>
           </a:p>
           <a:p>
             <a:r>
-              <a:rPr lang="fr-FR" dirty="0" smtClean="0"/>
+              <a:rPr lang="fr-FR" dirty="0"/>
               <a:t>Paramètres contrôlés par 6</a:t>
             </a:r>
-            <a:endParaRPr lang="fr-FR" dirty="0"/>
           </a:p>
         </p:txBody>
       </p:sp>
@@ -3480,7 +3457,7 @@
           <a:p>
             <a:pPr algn="ctr"/>
             <a:r>
-              <a:rPr lang="fr-FR" sz="2000" b="1" dirty="0" smtClean="0">
+              <a:rPr lang="fr-FR" sz="2000" b="1" dirty="0">
                 <a:solidFill>
                   <a:schemeClr val="tx1">
                     <a:lumMod val="65000"/>
@@ -3490,14 +3467,6 @@
               </a:rPr>
               <a:t>Microscope à Illumination Structurée</a:t>
             </a:r>
-            <a:endParaRPr lang="fr-FR" sz="2000" b="1" dirty="0">
-              <a:solidFill>
-                <a:schemeClr val="tx1">
-                  <a:lumMod val="65000"/>
-                  <a:lumOff val="35000"/>
-                </a:schemeClr>
-              </a:solidFill>
-            </a:endParaRPr>
           </a:p>
         </p:txBody>
       </p:sp>
@@ -3560,7 +3529,7 @@
           <a:p>
             <a:pPr algn="r"/>
             <a:r>
-              <a:rPr lang="fr-FR" sz="2000" b="1" dirty="0" smtClean="0">
+              <a:rPr lang="fr-FR" sz="2000" b="1" dirty="0">
                 <a:solidFill>
                   <a:schemeClr val="accent4">
                     <a:lumMod val="75000"/>
@@ -3569,13 +3538,6 @@
               </a:rPr>
               <a:t>Interface de la caméra</a:t>
             </a:r>
-            <a:endParaRPr lang="fr-FR" sz="2000" b="1" dirty="0">
-              <a:solidFill>
-                <a:schemeClr val="accent4">
-                  <a:lumMod val="75000"/>
-                </a:schemeClr>
-              </a:solidFill>
-            </a:endParaRPr>
           </a:p>
         </p:txBody>
       </p:sp>
@@ -3625,18 +3587,17 @@
           <a:lstStyle/>
           <a:p>
             <a:r>
-              <a:rPr lang="fr-FR" dirty="0" smtClean="0"/>
+              <a:rPr lang="fr-FR" dirty="0"/>
               <a:t>6 : </a:t>
             </a:r>
             <a:r>
-              <a:rPr lang="fr-FR" dirty="0" err="1" smtClean="0"/>
+              <a:rPr lang="fr-FR" dirty="0" err="1"/>
               <a:t>Sensor</a:t>
             </a:r>
             <a:r>
-              <a:rPr lang="fr-FR" dirty="0" smtClean="0"/>
+              <a:rPr lang="fr-FR" dirty="0"/>
               <a:t> Settings</a:t>
             </a:r>
-            <a:endParaRPr lang="fr-FR" dirty="0"/>
           </a:p>
         </p:txBody>
       </p:sp>
@@ -3656,46 +3617,45 @@
           <a:lstStyle/>
           <a:p>
             <a:r>
-              <a:rPr lang="fr-FR" dirty="0" smtClean="0"/>
+              <a:rPr lang="fr-FR" dirty="0"/>
               <a:t>‘</a:t>
             </a:r>
             <a:r>
-              <a:rPr lang="fr-FR" dirty="0" err="1" smtClean="0"/>
+              <a:rPr lang="fr-FR" dirty="0" err="1"/>
               <a:t>Exposure</a:t>
             </a:r>
             <a:r>
-              <a:rPr lang="fr-FR" dirty="0" smtClean="0"/>
+              <a:rPr lang="fr-FR" dirty="0"/>
               <a:t> Time’ : permet de régler le temps d’exposition, Réglage possible avec le </a:t>
             </a:r>
             <a:r>
-              <a:rPr lang="fr-FR" dirty="0" err="1" smtClean="0"/>
+              <a:rPr lang="fr-FR" dirty="0" err="1"/>
               <a:t>slider</a:t>
             </a:r>
             <a:r>
-              <a:rPr lang="fr-FR" dirty="0" smtClean="0"/>
+              <a:rPr lang="fr-FR" dirty="0"/>
               <a:t> ou par saisie numérique </a:t>
             </a:r>
           </a:p>
           <a:p>
             <a:r>
-              <a:rPr lang="fr-FR" dirty="0" smtClean="0"/>
+              <a:rPr lang="fr-FR" dirty="0"/>
               <a:t>‘FPS’ : permet de régler le nombre d’images par seconde</a:t>
             </a:r>
           </a:p>
           <a:p>
             <a:r>
-              <a:rPr lang="fr-FR" dirty="0" smtClean="0"/>
+              <a:rPr lang="fr-FR" dirty="0"/>
               <a:t>‘</a:t>
             </a:r>
             <a:r>
-              <a:rPr lang="fr-FR" dirty="0" err="1" smtClean="0"/>
+              <a:rPr lang="fr-FR" dirty="0" err="1"/>
               <a:t>BlackLevel</a:t>
             </a:r>
             <a:r>
-              <a:rPr lang="fr-FR" dirty="0" smtClean="0"/>
+              <a:rPr lang="fr-FR" dirty="0"/>
               <a:t>’ : permet de régler le niveau de noir (??) </a:t>
             </a:r>
-            <a:endParaRPr lang="fr-FR" dirty="0"/>
           </a:p>
         </p:txBody>
       </p:sp>
@@ -3752,10 +3712,9 @@
           <a:lstStyle/>
           <a:p>
             <a:r>
-              <a:rPr lang="fr-FR" sz="3200" dirty="0" smtClean="0"/>
+              <a:rPr lang="fr-FR" sz="3200" dirty="0"/>
               <a:t>Guide Utilisateur Interface</a:t>
             </a:r>
-            <a:endParaRPr lang="fr-FR" sz="3200" dirty="0"/>
           </a:p>
         </p:txBody>
       </p:sp>
@@ -3854,7 +3813,7 @@
           <a:p>
             <a:pPr algn="ctr"/>
             <a:r>
-              <a:rPr lang="fr-FR" sz="2000" b="1" dirty="0" smtClean="0">
+              <a:rPr lang="fr-FR" sz="2000" b="1" dirty="0">
                 <a:solidFill>
                   <a:schemeClr val="tx1">
                     <a:lumMod val="65000"/>
@@ -3864,14 +3823,6 @@
               </a:rPr>
               <a:t>Microscope à Illumination Structurée</a:t>
             </a:r>
-            <a:endParaRPr lang="fr-FR" sz="2000" b="1" dirty="0">
-              <a:solidFill>
-                <a:schemeClr val="tx1">
-                  <a:lumMod val="65000"/>
-                  <a:lumOff val="35000"/>
-                </a:schemeClr>
-              </a:solidFill>
-            </a:endParaRPr>
           </a:p>
         </p:txBody>
       </p:sp>
@@ -3934,7 +3885,7 @@
           <a:p>
             <a:pPr algn="ctr"/>
             <a:r>
-              <a:rPr lang="fr-FR" sz="1100" dirty="0" smtClean="0">
+              <a:rPr lang="fr-FR" sz="1100" dirty="0">
                 <a:solidFill>
                   <a:schemeClr val="tx1">
                     <a:lumMod val="65000"/>
@@ -3944,14 +3895,6 @@
               </a:rPr>
               <a:t>Interface réalisée par Romain Etienne / Promo 2025 – juin 2023</a:t>
             </a:r>
-            <a:endParaRPr lang="fr-FR" sz="1100" dirty="0">
-              <a:solidFill>
-                <a:schemeClr val="tx1">
-                  <a:lumMod val="65000"/>
-                  <a:lumOff val="35000"/>
-                </a:schemeClr>
-              </a:solidFill>
-            </a:endParaRPr>
           </a:p>
         </p:txBody>
       </p:sp>
@@ -3994,7 +3937,7 @@
           </a:lstStyle>
           <a:p>
             <a:r>
-              <a:rPr lang="fr-FR" sz="2400" b="1" dirty="0" smtClean="0">
+              <a:rPr lang="fr-FR" sz="2400" b="1" dirty="0">
                 <a:solidFill>
                   <a:schemeClr val="accent6">
                     <a:lumMod val="75000"/>
@@ -4004,7 +3947,7 @@
               <a:t>DMD et </a:t>
             </a:r>
             <a:r>
-              <a:rPr lang="fr-FR" sz="2400" b="1" dirty="0" err="1" smtClean="0">
+              <a:rPr lang="fr-FR" sz="2400" b="1" dirty="0" err="1">
                 <a:solidFill>
                   <a:schemeClr val="accent6">
                     <a:lumMod val="75000"/>
@@ -4069,10 +4012,9 @@
           <a:lstStyle/>
           <a:p>
             <a:r>
-              <a:rPr lang="fr-FR" dirty="0" smtClean="0"/>
+              <a:rPr lang="fr-FR" dirty="0"/>
               <a:t>7 : Hardware Connection</a:t>
             </a:r>
-            <a:endParaRPr lang="fr-FR" dirty="0"/>
           </a:p>
         </p:txBody>
       </p:sp>
@@ -4092,43 +4034,42 @@
           <a:lstStyle/>
           <a:p>
             <a:r>
-              <a:rPr lang="fr-FR" dirty="0" smtClean="0"/>
+              <a:rPr lang="fr-FR" dirty="0"/>
               <a:t>La liste déroulante permet de sélectionner le COM de la carte contrôlant le </a:t>
             </a:r>
             <a:r>
-              <a:rPr lang="fr-FR" dirty="0" err="1" smtClean="0"/>
+              <a:rPr lang="fr-FR" dirty="0" err="1"/>
               <a:t>Piezo</a:t>
             </a:r>
-            <a:endParaRPr lang="fr-FR" dirty="0" smtClean="0"/>
-          </a:p>
-          <a:p>
-            <a:r>
-              <a:rPr lang="fr-FR" dirty="0" smtClean="0"/>
+            <a:endParaRPr lang="fr-FR" dirty="0"/>
+          </a:p>
+          <a:p>
+            <a:r>
+              <a:rPr lang="fr-FR" dirty="0"/>
               <a:t>‘Connection’ permet de connecter au </a:t>
             </a:r>
             <a:r>
-              <a:rPr lang="fr-FR" dirty="0" err="1" smtClean="0"/>
+              <a:rPr lang="fr-FR" dirty="0" err="1"/>
               <a:t>Piezo</a:t>
             </a:r>
             <a:r>
-              <a:rPr lang="fr-FR" dirty="0" smtClean="0"/>
+              <a:rPr lang="fr-FR" dirty="0"/>
               <a:t>, il faut le faire pour le contrôler manuellement avec 10</a:t>
             </a:r>
           </a:p>
           <a:p>
             <a:r>
-              <a:rPr lang="fr-FR" dirty="0" smtClean="0"/>
+              <a:rPr lang="fr-FR" dirty="0"/>
               <a:t>Si le </a:t>
             </a:r>
             <a:r>
-              <a:rPr lang="fr-FR" dirty="0" err="1" smtClean="0"/>
+              <a:rPr lang="fr-FR" dirty="0" err="1"/>
               <a:t>Piezo</a:t>
             </a:r>
             <a:r>
-              <a:rPr lang="fr-FR" dirty="0" smtClean="0"/>
+              <a:rPr lang="fr-FR" dirty="0"/>
               <a:t> est bien connecté, la LED s’allume en rouge</a:t>
             </a:r>
-            <a:endParaRPr lang="fr-FR" dirty="0"/>
           </a:p>
         </p:txBody>
       </p:sp>
@@ -4178,18 +4119,17 @@
           <a:lstStyle/>
           <a:p>
             <a:r>
-              <a:rPr lang="fr-FR" dirty="0" smtClean="0"/>
+              <a:rPr lang="fr-FR" dirty="0"/>
               <a:t>10 : </a:t>
             </a:r>
             <a:r>
-              <a:rPr lang="fr-FR" dirty="0" err="1" smtClean="0"/>
+              <a:rPr lang="fr-FR" dirty="0" err="1"/>
               <a:t>Piezo</a:t>
             </a:r>
             <a:r>
-              <a:rPr lang="fr-FR" dirty="0" smtClean="0"/>
+              <a:rPr lang="fr-FR" dirty="0"/>
               <a:t> Control</a:t>
             </a:r>
-            <a:endParaRPr lang="fr-FR" dirty="0"/>
           </a:p>
         </p:txBody>
       </p:sp>
@@ -4209,32 +4149,31 @@
           <a:lstStyle/>
           <a:p>
             <a:r>
-              <a:rPr lang="fr-FR" dirty="0" smtClean="0"/>
+              <a:rPr lang="fr-FR" dirty="0"/>
               <a:t>‘Z Axis’ : réglage grossier du </a:t>
             </a:r>
             <a:r>
-              <a:rPr lang="fr-FR" dirty="0" err="1" smtClean="0"/>
+              <a:rPr lang="fr-FR" dirty="0" err="1"/>
               <a:t>Piezo</a:t>
             </a:r>
-            <a:endParaRPr lang="fr-FR" dirty="0" smtClean="0"/>
-          </a:p>
-          <a:p>
-            <a:r>
-              <a:rPr lang="fr-FR" dirty="0" smtClean="0"/>
+            <a:endParaRPr lang="fr-FR" dirty="0"/>
+          </a:p>
+          <a:p>
+            <a:r>
+              <a:rPr lang="fr-FR" dirty="0"/>
               <a:t>‘Fine Z’ : réglage fin du </a:t>
             </a:r>
             <a:r>
-              <a:rPr lang="fr-FR" dirty="0" err="1" smtClean="0"/>
+              <a:rPr lang="fr-FR" dirty="0" err="1"/>
               <a:t>Piezo</a:t>
             </a:r>
-            <a:endParaRPr lang="fr-FR" dirty="0" smtClean="0"/>
-          </a:p>
-          <a:p>
-            <a:r>
-              <a:rPr lang="fr-FR" dirty="0" smtClean="0"/>
+            <a:endParaRPr lang="fr-FR" dirty="0"/>
+          </a:p>
+          <a:p>
+            <a:r>
+              <a:rPr lang="fr-FR" dirty="0"/>
               <a:t>Il est possible de rentrer les deux valeurs séparément sur la droite</a:t>
             </a:r>
-            <a:endParaRPr lang="fr-FR" dirty="0"/>
           </a:p>
         </p:txBody>
       </p:sp>
@@ -4284,10 +4223,9 @@
           <a:lstStyle/>
           <a:p>
             <a:r>
-              <a:rPr lang="fr-FR" dirty="0" smtClean="0"/>
+              <a:rPr lang="fr-FR" dirty="0"/>
               <a:t>8 : DMD Settings</a:t>
             </a:r>
-            <a:endParaRPr lang="fr-FR" dirty="0"/>
           </a:p>
         </p:txBody>
       </p:sp>
@@ -4309,58 +4247,57 @@
           <a:lstStyle/>
           <a:p>
             <a:r>
-              <a:rPr lang="fr-FR" dirty="0" smtClean="0"/>
+              <a:rPr lang="fr-FR" dirty="0"/>
               <a:t>‘Pattern </a:t>
             </a:r>
             <a:r>
-              <a:rPr lang="fr-FR" dirty="0" err="1" smtClean="0"/>
+              <a:rPr lang="fr-FR" dirty="0" err="1"/>
               <a:t>Choice</a:t>
             </a:r>
             <a:r>
-              <a:rPr lang="fr-FR" dirty="0" smtClean="0"/>
+              <a:rPr lang="fr-FR" dirty="0"/>
               <a:t>’ : permet de choisir le pattern</a:t>
             </a:r>
           </a:p>
           <a:p>
             <a:r>
-              <a:rPr lang="fr-FR" dirty="0" smtClean="0"/>
+              <a:rPr lang="fr-FR" dirty="0"/>
               <a:t>‘</a:t>
             </a:r>
             <a:r>
-              <a:rPr lang="fr-FR" dirty="0" err="1" smtClean="0"/>
+              <a:rPr lang="fr-FR" dirty="0" err="1"/>
               <a:t>Load</a:t>
             </a:r>
             <a:r>
-              <a:rPr lang="fr-FR" dirty="0" smtClean="0"/>
+              <a:rPr lang="fr-FR" dirty="0"/>
               <a:t>’ : permet de charger le pattern manuellement dans le DMD</a:t>
             </a:r>
           </a:p>
           <a:p>
             <a:r>
-              <a:rPr lang="fr-FR" dirty="0" smtClean="0"/>
+              <a:rPr lang="fr-FR" dirty="0"/>
               <a:t>‘Reset’ : permet de vider les choix de patterns, à ne surtout pas confondre avec ‘Reset DMD’</a:t>
             </a:r>
           </a:p>
           <a:p>
             <a:r>
-              <a:rPr lang="fr-FR" dirty="0" smtClean="0"/>
+              <a:rPr lang="fr-FR" dirty="0"/>
               <a:t>‘</a:t>
             </a:r>
             <a:r>
-              <a:rPr lang="fr-FR" dirty="0" err="1" smtClean="0"/>
+              <a:rPr lang="fr-FR" dirty="0" err="1"/>
               <a:t>View</a:t>
             </a:r>
             <a:r>
-              <a:rPr lang="fr-FR" dirty="0" smtClean="0"/>
+              <a:rPr lang="fr-FR" dirty="0"/>
               <a:t> Test’ : permet de voir l’image test</a:t>
             </a:r>
           </a:p>
           <a:p>
             <a:r>
-              <a:rPr lang="fr-FR" dirty="0" smtClean="0"/>
+              <a:rPr lang="fr-FR" dirty="0"/>
               <a:t>‘TEST’ : permet de charger l’image dans le DMD pour s’assurer de son bon fonctionnement</a:t>
             </a:r>
-            <a:endParaRPr lang="fr-FR" dirty="0"/>
           </a:p>
         </p:txBody>
       </p:sp>
@@ -4410,19 +4347,19 @@
           <a:lstStyle/>
           <a:p>
             <a:r>
-              <a:rPr lang="fr-FR" dirty="0" smtClean="0"/>
+              <a:rPr lang="fr-FR" dirty="0"/>
               <a:t>Pattern </a:t>
             </a:r>
             <a:r>
-              <a:rPr lang="fr-FR" dirty="0" err="1" smtClean="0"/>
+              <a:rPr lang="fr-FR" dirty="0" err="1"/>
               <a:t>Choice</a:t>
             </a:r>
             <a:r>
-              <a:rPr lang="fr-FR" dirty="0" smtClean="0"/>
+              <a:rPr lang="fr-FR" dirty="0"/>
               <a:t> </a:t>
             </a:r>
             <a:r>
-              <a:rPr lang="fr-FR" dirty="0" err="1" smtClean="0"/>
+              <a:rPr lang="fr-FR" dirty="0" err="1"/>
               <a:t>Window</a:t>
             </a:r>
             <a:endParaRPr lang="fr-FR" dirty="0"/>
@@ -4504,11 +4441,11 @@
           <a:lstStyle/>
           <a:p>
             <a:r>
-              <a:rPr lang="fr-FR" dirty="0" smtClean="0"/>
+              <a:rPr lang="fr-FR" dirty="0"/>
               <a:t>Pattern </a:t>
             </a:r>
             <a:r>
-              <a:rPr lang="fr-FR" dirty="0" err="1" smtClean="0"/>
+              <a:rPr lang="fr-FR" dirty="0" err="1"/>
               <a:t>Choice</a:t>
             </a:r>
             <a:endParaRPr lang="fr-FR" dirty="0"/>
@@ -4533,39 +4470,39 @@
           <a:lstStyle/>
           <a:p>
             <a:r>
-              <a:rPr lang="fr-FR" dirty="0" smtClean="0"/>
+              <a:rPr lang="fr-FR" dirty="0"/>
               <a:t>‘Image </a:t>
             </a:r>
             <a:r>
-              <a:rPr lang="fr-FR" dirty="0" err="1" smtClean="0"/>
+              <a:rPr lang="fr-FR" dirty="0" err="1"/>
               <a:t>Choice</a:t>
             </a:r>
             <a:r>
-              <a:rPr lang="fr-FR" dirty="0" smtClean="0"/>
+              <a:rPr lang="fr-FR" dirty="0"/>
               <a:t>’ : permet de choisir l’image voulue</a:t>
             </a:r>
           </a:p>
           <a:p>
             <a:r>
-              <a:rPr lang="fr-FR" dirty="0" smtClean="0"/>
+              <a:rPr lang="fr-FR" dirty="0"/>
               <a:t>‘Image Save’ : permet de ‘Save’ l’image pour ensuite la ‘</a:t>
             </a:r>
             <a:r>
-              <a:rPr lang="fr-FR" dirty="0" err="1" smtClean="0"/>
+              <a:rPr lang="fr-FR" dirty="0" err="1"/>
               <a:t>Load</a:t>
             </a:r>
             <a:r>
-              <a:rPr lang="fr-FR" dirty="0" smtClean="0"/>
+              <a:rPr lang="fr-FR" dirty="0"/>
               <a:t>’</a:t>
             </a:r>
           </a:p>
           <a:p>
             <a:r>
-              <a:rPr lang="fr-FR" dirty="0" smtClean="0"/>
+              <a:rPr lang="fr-FR" dirty="0"/>
               <a:t>L’image va automatiquement s’afficher lorsqu’elle sera sélectionnée, il y en a déjà rentrées </a:t>
             </a:r>
             <a:r>
-              <a:rPr lang="fr-FR" smtClean="0"/>
+              <a:rPr lang="fr-FR"/>
               <a:t>par défaut</a:t>
             </a:r>
             <a:endParaRPr lang="fr-FR" dirty="0"/>
@@ -4625,10 +4562,9 @@
           <a:lstStyle/>
           <a:p>
             <a:r>
-              <a:rPr lang="fr-FR" sz="3200" dirty="0" smtClean="0"/>
+              <a:rPr lang="fr-FR" sz="3200" dirty="0"/>
               <a:t>Guide Utilisateur Interface</a:t>
             </a:r>
-            <a:endParaRPr lang="fr-FR" sz="3200" dirty="0"/>
           </a:p>
         </p:txBody>
       </p:sp>
@@ -4727,7 +4663,7 @@
           <a:p>
             <a:pPr algn="ctr"/>
             <a:r>
-              <a:rPr lang="fr-FR" sz="2000" b="1" dirty="0" smtClean="0">
+              <a:rPr lang="fr-FR" sz="2000" b="1" dirty="0">
                 <a:solidFill>
                   <a:schemeClr val="tx1">
                     <a:lumMod val="65000"/>
@@ -4737,14 +4673,6 @@
               </a:rPr>
               <a:t>Microscope à Illumination Structurée</a:t>
             </a:r>
-            <a:endParaRPr lang="fr-FR" sz="2000" b="1" dirty="0">
-              <a:solidFill>
-                <a:schemeClr val="tx1">
-                  <a:lumMod val="65000"/>
-                  <a:lumOff val="35000"/>
-                </a:schemeClr>
-              </a:solidFill>
-            </a:endParaRPr>
           </a:p>
         </p:txBody>
       </p:sp>
@@ -4807,7 +4735,7 @@
           <a:p>
             <a:pPr algn="ctr"/>
             <a:r>
-              <a:rPr lang="fr-FR" sz="1100" dirty="0" smtClean="0">
+              <a:rPr lang="fr-FR" sz="1100" dirty="0">
                 <a:solidFill>
                   <a:schemeClr val="tx1">
                     <a:lumMod val="65000"/>
@@ -4817,14 +4745,6 @@
               </a:rPr>
               <a:t>Interface réalisée par Romain Etienne / Promo 2025 – juin 2023</a:t>
             </a:r>
-            <a:endParaRPr lang="fr-FR" sz="1100" dirty="0">
-              <a:solidFill>
-                <a:schemeClr val="tx1">
-                  <a:lumMod val="65000"/>
-                  <a:lumOff val="35000"/>
-                </a:schemeClr>
-              </a:solidFill>
-            </a:endParaRPr>
           </a:p>
         </p:txBody>
       </p:sp>
@@ -4867,7 +4787,7 @@
           </a:lstStyle>
           <a:p>
             <a:r>
-              <a:rPr lang="fr-FR" sz="2400" b="1" dirty="0" smtClean="0">
+              <a:rPr lang="fr-FR" sz="2400" b="1" dirty="0">
                 <a:solidFill>
                   <a:schemeClr val="accent6">
                     <a:lumMod val="75000"/>
@@ -4876,13 +4796,6 @@
               </a:rPr>
               <a:t>Paramètres du mode automatique</a:t>
             </a:r>
-            <a:endParaRPr lang="fr-FR" sz="2400" b="1" dirty="0">
-              <a:solidFill>
-                <a:schemeClr val="accent6">
-                  <a:lumMod val="75000"/>
-                </a:schemeClr>
-              </a:solidFill>
-            </a:endParaRPr>
           </a:p>
         </p:txBody>
       </p:sp>
@@ -4932,18 +4845,17 @@
           <a:lstStyle/>
           <a:p>
             <a:r>
-              <a:rPr lang="fr-FR" dirty="0" smtClean="0"/>
+              <a:rPr lang="fr-FR" dirty="0"/>
               <a:t>9 : </a:t>
             </a:r>
             <a:r>
-              <a:rPr lang="fr-FR" dirty="0" err="1" smtClean="0"/>
+              <a:rPr lang="fr-FR" dirty="0" err="1"/>
               <a:t>Automatic</a:t>
             </a:r>
             <a:r>
-              <a:rPr lang="fr-FR" dirty="0" smtClean="0"/>
+              <a:rPr lang="fr-FR" dirty="0"/>
               <a:t> Mode</a:t>
             </a:r>
-            <a:endParaRPr lang="fr-FR" dirty="0"/>
           </a:p>
         </p:txBody>
       </p:sp>
@@ -4963,24 +4875,23 @@
           <a:lstStyle/>
           <a:p>
             <a:r>
-              <a:rPr lang="fr-FR" dirty="0" smtClean="0"/>
+              <a:rPr lang="fr-FR" dirty="0"/>
               <a:t>‘</a:t>
             </a:r>
             <a:r>
-              <a:rPr lang="fr-FR" dirty="0" err="1" smtClean="0"/>
+              <a:rPr lang="fr-FR" dirty="0" err="1"/>
               <a:t>Parameters</a:t>
             </a:r>
             <a:r>
-              <a:rPr lang="fr-FR" dirty="0" smtClean="0"/>
+              <a:rPr lang="fr-FR" dirty="0"/>
               <a:t>’ : permet d’ouvrir la fenêtre créant les paramètres</a:t>
             </a:r>
           </a:p>
           <a:p>
             <a:r>
-              <a:rPr lang="fr-FR" dirty="0" smtClean="0"/>
+              <a:rPr lang="fr-FR" dirty="0"/>
               <a:t>‘START’ : lance l’acquisition conformément aux paramètre de cette dernière</a:t>
             </a:r>
-            <a:endParaRPr lang="fr-FR" dirty="0"/>
           </a:p>
         </p:txBody>
       </p:sp>
@@ -5079,7 +4990,7 @@
           <a:p>
             <a:pPr algn="ctr"/>
             <a:r>
-              <a:rPr lang="fr-FR" sz="2000" b="1" dirty="0" smtClean="0">
+              <a:rPr lang="fr-FR" sz="2000" b="1" dirty="0">
                 <a:solidFill>
                   <a:schemeClr val="tx1">
                     <a:lumMod val="65000"/>
@@ -5089,14 +5000,6 @@
               </a:rPr>
               <a:t>Microscope à Illumination Structurée</a:t>
             </a:r>
-            <a:endParaRPr lang="fr-FR" sz="2000" b="1" dirty="0">
-              <a:solidFill>
-                <a:schemeClr val="tx1">
-                  <a:lumMod val="65000"/>
-                  <a:lumOff val="35000"/>
-                </a:schemeClr>
-              </a:solidFill>
-            </a:endParaRPr>
           </a:p>
         </p:txBody>
       </p:sp>
@@ -5158,32 +5061,32 @@
           <a:lstStyle/>
           <a:p>
             <a:r>
-              <a:rPr lang="fr-FR" dirty="0" smtClean="0"/>
+              <a:rPr lang="fr-FR" dirty="0"/>
               <a:t>Cette interface permet de piloter l’ensemble des éléments de </a:t>
             </a:r>
             <a:r>
-              <a:rPr lang="fr-FR" b="1" dirty="0" smtClean="0"/>
+              <a:rPr lang="fr-FR" b="1" dirty="0"/>
               <a:t>l’expérience de microscopie à illumination structurée</a:t>
             </a:r>
             <a:r>
-              <a:rPr lang="fr-FR" dirty="0" smtClean="0"/>
+              <a:rPr lang="fr-FR" dirty="0"/>
               <a:t> proposée par le </a:t>
             </a:r>
             <a:r>
-              <a:rPr lang="fr-FR" dirty="0" err="1" smtClean="0"/>
+              <a:rPr lang="fr-FR" dirty="0" err="1"/>
               <a:t>LEnsE</a:t>
             </a:r>
             <a:r>
-              <a:rPr lang="fr-FR" dirty="0" smtClean="0"/>
+              <a:rPr lang="fr-FR" dirty="0"/>
               <a:t>.</a:t>
             </a:r>
           </a:p>
           <a:p>
-            <a:endParaRPr lang="fr-FR" sz="1600" dirty="0" smtClean="0"/>
-          </a:p>
-          <a:p>
-            <a:r>
-              <a:rPr lang="fr-FR" b="1" dirty="0" smtClean="0">
+            <a:endParaRPr lang="fr-FR" sz="1600" dirty="0"/>
+          </a:p>
+          <a:p>
+            <a:r>
+              <a:rPr lang="fr-FR" b="1" dirty="0">
                 <a:solidFill>
                   <a:schemeClr val="accent6">
                     <a:lumMod val="75000"/>
@@ -5198,60 +5101,55 @@
           </a:p>
           <a:p>
             <a:r>
-              <a:rPr lang="fr-FR" dirty="0" smtClean="0"/>
+              <a:rPr lang="fr-FR" dirty="0"/>
               <a:t>La caméra (type BASLER xxx), montée sur le microscope, doit être connectée en USB sur le PC.</a:t>
             </a:r>
           </a:p>
           <a:p>
-            <a:endParaRPr lang="fr-FR" dirty="0" smtClean="0"/>
-          </a:p>
-          <a:p>
-            <a:r>
-              <a:rPr lang="fr-FR" dirty="0" smtClean="0"/>
+            <a:endParaRPr lang="fr-FR" dirty="0"/>
+          </a:p>
+          <a:p>
+            <a:r>
+              <a:rPr lang="fr-FR" dirty="0"/>
               <a:t>Le système de micro-</a:t>
             </a:r>
             <a:r>
-              <a:rPr lang="fr-FR" dirty="0" err="1" smtClean="0"/>
+              <a:rPr lang="fr-FR" dirty="0" err="1"/>
               <a:t>mirroirs</a:t>
             </a:r>
             <a:r>
-              <a:rPr lang="fr-FR" dirty="0" smtClean="0"/>
+              <a:rPr lang="fr-FR" dirty="0"/>
               <a:t> (</a:t>
             </a:r>
             <a:r>
-              <a:rPr lang="fr-FR" i="1" dirty="0" smtClean="0"/>
+              <a:rPr lang="fr-FR" i="1" dirty="0"/>
               <a:t>DMD – Digital </a:t>
             </a:r>
             <a:r>
-              <a:rPr lang="fr-FR" i="1" dirty="0" err="1" smtClean="0"/>
+              <a:rPr lang="fr-FR" i="1" dirty="0" err="1"/>
               <a:t>Micromirror</a:t>
             </a:r>
             <a:r>
-              <a:rPr lang="fr-FR" i="1" dirty="0" smtClean="0"/>
+              <a:rPr lang="fr-FR" i="1" dirty="0"/>
               <a:t> </a:t>
             </a:r>
             <a:r>
-              <a:rPr lang="fr-FR" i="1" dirty="0" err="1" smtClean="0"/>
+              <a:rPr lang="fr-FR" i="1" dirty="0" err="1"/>
               <a:t>Device</a:t>
             </a:r>
             <a:r>
-              <a:rPr lang="fr-FR" dirty="0" smtClean="0"/>
+              <a:rPr lang="fr-FR" dirty="0"/>
               <a:t>) doit être connecté en USB sur le PC et alimenté.</a:t>
             </a:r>
           </a:p>
           <a:p>
-            <a:endParaRPr lang="fr-FR" dirty="0" smtClean="0"/>
-          </a:p>
-          <a:p>
-            <a:r>
-              <a:rPr lang="fr-FR" dirty="0" smtClean="0"/>
-              <a:t>Le système de contrôle du module piézo-électrique doit être alimenté. La carte de commande doit être reliée en USB et être </a:t>
-            </a:r>
-            <a:r>
-              <a:rPr lang="fr-FR" dirty="0" smtClean="0"/>
-              <a:t>alimentée en 12V continu. </a:t>
-            </a:r>
             <a:endParaRPr lang="fr-FR" dirty="0"/>
+          </a:p>
+          <a:p>
+            <a:r>
+              <a:rPr lang="fr-FR" dirty="0"/>
+              <a:t>Le système de contrôle du module piézo-électrique doit être alimenté. La carte de commande doit être reliée en USB et être alimentée en 12V continu. </a:t>
+            </a:r>
           </a:p>
         </p:txBody>
       </p:sp>
@@ -5277,7 +5175,7 @@
           <a:lstStyle/>
           <a:p>
             <a:r>
-              <a:rPr lang="fr-FR" b="1" dirty="0" smtClean="0">
+              <a:rPr lang="fr-FR" b="1" dirty="0">
                 <a:solidFill>
                   <a:schemeClr val="accent6">
                     <a:lumMod val="75000"/>
@@ -5286,28 +5184,21 @@
               </a:rPr>
               <a:t>LANCEMENT DE L’INTERFACE</a:t>
             </a:r>
-            <a:endParaRPr lang="fr-FR" b="1" dirty="0">
-              <a:solidFill>
-                <a:schemeClr val="accent6">
-                  <a:lumMod val="75000"/>
-                </a:schemeClr>
-              </a:solidFill>
-            </a:endParaRPr>
           </a:p>
           <a:p>
             <a:endParaRPr lang="fr-FR" dirty="0"/>
           </a:p>
           <a:p>
             <a:r>
-              <a:rPr lang="fr-FR" dirty="0" smtClean="0"/>
+              <a:rPr lang="fr-FR" dirty="0"/>
               <a:t>Pour lancer l’interface de contrôle, double-cliquer sur le fichier </a:t>
             </a:r>
             <a:r>
-              <a:rPr lang="fr-FR" b="1" dirty="0" smtClean="0"/>
+              <a:rPr lang="fr-FR" b="1" dirty="0"/>
               <a:t>start_bio_phot.bat</a:t>
             </a:r>
             <a:r>
-              <a:rPr lang="fr-FR" dirty="0" smtClean="0"/>
+              <a:rPr lang="fr-FR" dirty="0"/>
               <a:t> sur le bureau de ce PC.</a:t>
             </a:r>
             <a:endParaRPr lang="fr-FR" b="1" dirty="0"/>
@@ -5414,15 +5305,15 @@
           <a:lstStyle/>
           <a:p>
             <a:r>
-              <a:rPr lang="fr-FR" dirty="0" err="1" smtClean="0"/>
+              <a:rPr lang="fr-FR" dirty="0" err="1"/>
               <a:t>Automatic</a:t>
             </a:r>
             <a:r>
-              <a:rPr lang="fr-FR" dirty="0" smtClean="0"/>
+              <a:rPr lang="fr-FR" dirty="0"/>
               <a:t> Mode </a:t>
             </a:r>
             <a:r>
-              <a:rPr lang="fr-FR" dirty="0" err="1" smtClean="0"/>
+              <a:rPr lang="fr-FR" dirty="0" err="1"/>
               <a:t>Window</a:t>
             </a:r>
             <a:endParaRPr lang="fr-FR" dirty="0"/>
@@ -5504,15 +5395,15 @@
           <a:lstStyle/>
           <a:p>
             <a:r>
-              <a:rPr lang="fr-FR" dirty="0" err="1" smtClean="0"/>
+              <a:rPr lang="fr-FR" dirty="0" err="1"/>
               <a:t>Automatic</a:t>
             </a:r>
             <a:r>
-              <a:rPr lang="fr-FR" dirty="0" smtClean="0"/>
+              <a:rPr lang="fr-FR" dirty="0"/>
               <a:t> Mode </a:t>
             </a:r>
             <a:r>
-              <a:rPr lang="fr-FR" dirty="0" err="1" smtClean="0"/>
+              <a:rPr lang="fr-FR" dirty="0" err="1"/>
               <a:t>Window</a:t>
             </a:r>
             <a:endParaRPr lang="fr-FR" dirty="0"/>
@@ -5535,57 +5426,57 @@
           <a:lstStyle/>
           <a:p>
             <a:r>
-              <a:rPr lang="fr-FR" dirty="0" smtClean="0"/>
+              <a:rPr lang="fr-FR" dirty="0"/>
               <a:t>‘Directory’ : sert à choisir dans quel fichier sera créer le sous-fichier avec les scans</a:t>
             </a:r>
           </a:p>
           <a:p>
             <a:r>
-              <a:rPr lang="fr-FR" dirty="0" smtClean="0"/>
+              <a:rPr lang="fr-FR" dirty="0"/>
               <a:t>‘Z </a:t>
             </a:r>
             <a:r>
-              <a:rPr lang="fr-FR" dirty="0" err="1" smtClean="0"/>
+              <a:rPr lang="fr-FR" dirty="0" err="1"/>
               <a:t>Displacement</a:t>
             </a:r>
             <a:r>
-              <a:rPr lang="fr-FR" dirty="0" smtClean="0"/>
+              <a:rPr lang="fr-FR" dirty="0"/>
               <a:t>’ : étendue totale sur laquelle va se déplacer l’acquisition</a:t>
             </a:r>
           </a:p>
           <a:p>
             <a:r>
-              <a:rPr lang="fr-FR" dirty="0" smtClean="0"/>
+              <a:rPr lang="fr-FR" dirty="0"/>
               <a:t>‘Z </a:t>
             </a:r>
             <a:r>
-              <a:rPr lang="fr-FR" dirty="0" err="1" smtClean="0"/>
+              <a:rPr lang="fr-FR" dirty="0" err="1"/>
               <a:t>Step</a:t>
             </a:r>
             <a:r>
-              <a:rPr lang="fr-FR" dirty="0" smtClean="0"/>
+              <a:rPr lang="fr-FR" dirty="0"/>
               <a:t>’ : pas avec lequel va se </a:t>
             </a:r>
             <a:r>
-              <a:rPr lang="fr-FR" dirty="0" err="1" smtClean="0"/>
+              <a:rPr lang="fr-FR" dirty="0" err="1"/>
               <a:t>dépacer</a:t>
             </a:r>
             <a:r>
-              <a:rPr lang="fr-FR" dirty="0" smtClean="0"/>
+              <a:rPr lang="fr-FR" dirty="0"/>
               <a:t> l’acquisition</a:t>
             </a:r>
           </a:p>
           <a:p>
             <a:r>
-              <a:rPr lang="fr-FR" dirty="0" smtClean="0"/>
+              <a:rPr lang="fr-FR" dirty="0"/>
               <a:t>‘Save </a:t>
             </a:r>
             <a:r>
-              <a:rPr lang="fr-FR" dirty="0" err="1" smtClean="0"/>
+              <a:rPr lang="fr-FR" dirty="0" err="1"/>
               <a:t>Parameters</a:t>
             </a:r>
             <a:r>
-              <a:rPr lang="fr-FR" dirty="0" smtClean="0"/>
+              <a:rPr lang="fr-FR" dirty="0"/>
               <a:t>’ : sauvegarde les paramètres dans un fichier ‘parameters.txt’</a:t>
             </a:r>
           </a:p>
@@ -5644,10 +5535,9 @@
           <a:lstStyle/>
           <a:p>
             <a:r>
-              <a:rPr lang="fr-FR" sz="3200" dirty="0" smtClean="0"/>
+              <a:rPr lang="fr-FR" sz="3200" dirty="0"/>
               <a:t>Guide Utilisateur Interface</a:t>
             </a:r>
-            <a:endParaRPr lang="fr-FR" sz="3200" dirty="0"/>
           </a:p>
         </p:txBody>
       </p:sp>
@@ -5746,7 +5636,7 @@
           <a:p>
             <a:pPr algn="ctr"/>
             <a:r>
-              <a:rPr lang="fr-FR" sz="2000" b="1" dirty="0" smtClean="0">
+              <a:rPr lang="fr-FR" sz="2000" b="1" dirty="0">
                 <a:solidFill>
                   <a:schemeClr val="tx1">
                     <a:lumMod val="65000"/>
@@ -5756,14 +5646,6 @@
               </a:rPr>
               <a:t>Microscope à Illumination Structurée</a:t>
             </a:r>
-            <a:endParaRPr lang="fr-FR" sz="2000" b="1" dirty="0">
-              <a:solidFill>
-                <a:schemeClr val="tx1">
-                  <a:lumMod val="65000"/>
-                  <a:lumOff val="35000"/>
-                </a:schemeClr>
-              </a:solidFill>
-            </a:endParaRPr>
           </a:p>
         </p:txBody>
       </p:sp>
@@ -5826,7 +5708,7 @@
           <a:p>
             <a:pPr algn="ctr"/>
             <a:r>
-              <a:rPr lang="fr-FR" sz="1100" dirty="0" smtClean="0">
+              <a:rPr lang="fr-FR" sz="1100" dirty="0">
                 <a:solidFill>
                   <a:schemeClr val="tx1">
                     <a:lumMod val="65000"/>
@@ -5836,14 +5718,6 @@
               </a:rPr>
               <a:t>Interface réalisée par Romain Etienne / Promo 2025 – juin 2023</a:t>
             </a:r>
-            <a:endParaRPr lang="fr-FR" sz="1100" dirty="0">
-              <a:solidFill>
-                <a:schemeClr val="tx1">
-                  <a:lumMod val="65000"/>
-                  <a:lumOff val="35000"/>
-                </a:schemeClr>
-              </a:solidFill>
-            </a:endParaRPr>
           </a:p>
         </p:txBody>
       </p:sp>
@@ -5886,7 +5760,7 @@
           </a:lstStyle>
           <a:p>
             <a:r>
-              <a:rPr lang="fr-FR" sz="2400" b="1" dirty="0" smtClean="0">
+              <a:rPr lang="fr-FR" sz="2400" b="1" dirty="0">
                 <a:solidFill>
                   <a:schemeClr val="accent6">
                     <a:lumMod val="75000"/>
@@ -5895,13 +5769,6 @@
               </a:rPr>
               <a:t>Quelques bugs récalcitrants…</a:t>
             </a:r>
-            <a:endParaRPr lang="fr-FR" sz="2400" b="1" dirty="0">
-              <a:solidFill>
-                <a:schemeClr val="accent6">
-                  <a:lumMod val="75000"/>
-                </a:schemeClr>
-              </a:solidFill>
-            </a:endParaRPr>
           </a:p>
         </p:txBody>
       </p:sp>
@@ -5953,10 +5820,9 @@
           <a:lstStyle/>
           <a:p>
             <a:r>
-              <a:rPr lang="fr-FR" dirty="0" smtClean="0"/>
+              <a:rPr lang="fr-FR" dirty="0"/>
               <a:t>4 : Reset DMD</a:t>
             </a:r>
-            <a:endParaRPr lang="fr-FR" dirty="0"/>
           </a:p>
         </p:txBody>
       </p:sp>
@@ -5976,27 +5842,27 @@
           <a:lstStyle/>
           <a:p>
             <a:r>
-              <a:rPr lang="fr-FR" dirty="0" smtClean="0"/>
+              <a:rPr lang="fr-FR" dirty="0"/>
               <a:t>N’appuyez pas sur ce bouton si vous n’en n’avez pas besoin</a:t>
             </a:r>
           </a:p>
           <a:p>
             <a:r>
-              <a:rPr lang="fr-FR" dirty="0" smtClean="0"/>
+              <a:rPr lang="fr-FR" dirty="0"/>
               <a:t>Ce dernier sert à Reset le DMD Texas Instrument, il faut l’utiliser si vous avez des bugs lors des ‘</a:t>
             </a:r>
             <a:r>
-              <a:rPr lang="fr-FR" dirty="0" err="1" smtClean="0"/>
+              <a:rPr lang="fr-FR" dirty="0" err="1"/>
               <a:t>Loads</a:t>
             </a:r>
             <a:r>
-              <a:rPr lang="fr-FR" dirty="0" smtClean="0"/>
+              <a:rPr lang="fr-FR" dirty="0"/>
               <a:t>’ ou de l’acquisition automatique</a:t>
             </a:r>
           </a:p>
           <a:p>
             <a:r>
-              <a:rPr lang="fr-FR" dirty="0" smtClean="0"/>
+              <a:rPr lang="fr-FR" dirty="0"/>
               <a:t>Exemple de bug qui demande un ‘Reset’ :</a:t>
             </a:r>
           </a:p>
@@ -6025,92 +5891,91 @@
           <a:lstStyle/>
           <a:p>
             <a:r>
-              <a:rPr lang="fr-FR" sz="1200" dirty="0" err="1" smtClean="0"/>
+              <a:rPr lang="fr-FR" sz="1200" dirty="0" err="1"/>
               <a:t>usb.core.USBError</a:t>
             </a:r>
             <a:r>
-              <a:rPr lang="fr-FR" sz="1200" dirty="0" smtClean="0"/>
+              <a:rPr lang="fr-FR" sz="1200" dirty="0"/>
               <a:t>: [</a:t>
             </a:r>
             <a:r>
-              <a:rPr lang="fr-FR" sz="1200" dirty="0" err="1" smtClean="0"/>
+              <a:rPr lang="fr-FR" sz="1200" dirty="0" err="1"/>
               <a:t>Errno</a:t>
             </a:r>
             <a:r>
-              <a:rPr lang="fr-FR" sz="1200" dirty="0" smtClean="0"/>
+              <a:rPr lang="fr-FR" sz="1200" dirty="0"/>
               <a:t> None] b'libusb0-dll:err [_</a:t>
             </a:r>
             <a:r>
-              <a:rPr lang="fr-FR" sz="1200" dirty="0" err="1" smtClean="0"/>
+              <a:rPr lang="fr-FR" sz="1200" dirty="0" err="1"/>
               <a:t>usb_reap_async</a:t>
             </a:r>
             <a:r>
-              <a:rPr lang="fr-FR" sz="1200" dirty="0" smtClean="0"/>
+              <a:rPr lang="fr-FR" sz="1200" dirty="0"/>
               <a:t>] </a:t>
             </a:r>
             <a:r>
-              <a:rPr lang="fr-FR" sz="1200" dirty="0" err="1" smtClean="0"/>
+              <a:rPr lang="fr-FR" sz="1200" dirty="0" err="1"/>
               <a:t>reaping</a:t>
             </a:r>
             <a:r>
-              <a:rPr lang="fr-FR" sz="1200" dirty="0" smtClean="0"/>
+              <a:rPr lang="fr-FR" sz="1200" dirty="0"/>
               <a:t> </a:t>
             </a:r>
             <a:r>
-              <a:rPr lang="fr-FR" sz="1200" dirty="0" err="1" smtClean="0"/>
+              <a:rPr lang="fr-FR" sz="1200" dirty="0" err="1"/>
               <a:t>request</a:t>
             </a:r>
             <a:r>
-              <a:rPr lang="fr-FR" sz="1200" dirty="0" smtClean="0"/>
+              <a:rPr lang="fr-FR" sz="1200" dirty="0"/>
               <a:t> </a:t>
             </a:r>
             <a:r>
-              <a:rPr lang="fr-FR" sz="1200" dirty="0" err="1" smtClean="0"/>
+              <a:rPr lang="fr-FR" sz="1200" dirty="0" err="1"/>
               <a:t>failed</a:t>
             </a:r>
             <a:r>
-              <a:rPr lang="fr-FR" sz="1200" dirty="0" smtClean="0"/>
+              <a:rPr lang="fr-FR" sz="1200" dirty="0"/>
               <a:t>, </a:t>
             </a:r>
             <a:r>
-              <a:rPr lang="fr-FR" sz="1200" dirty="0" err="1" smtClean="0"/>
+              <a:rPr lang="fr-FR" sz="1200" dirty="0" err="1"/>
               <a:t>win</a:t>
             </a:r>
             <a:r>
-              <a:rPr lang="fr-FR" sz="1200" dirty="0" smtClean="0"/>
+              <a:rPr lang="fr-FR" sz="1200" dirty="0"/>
               <a:t> </a:t>
             </a:r>
             <a:r>
-              <a:rPr lang="fr-FR" sz="1200" dirty="0" err="1" smtClean="0"/>
+              <a:rPr lang="fr-FR" sz="1200" dirty="0" err="1"/>
               <a:t>error</a:t>
             </a:r>
             <a:r>
-              <a:rPr lang="fr-FR" sz="1200" dirty="0" smtClean="0"/>
+              <a:rPr lang="fr-FR" sz="1200" dirty="0"/>
               <a:t>: L\x92op\xe9ration d\x92entr\xe9e/sortie a \xe9t\xe9 </a:t>
             </a:r>
             <a:r>
-              <a:rPr lang="fr-FR" sz="1200" dirty="0" err="1" smtClean="0"/>
+              <a:rPr lang="fr-FR" sz="1200" dirty="0" err="1"/>
               <a:t>abandonn</a:t>
             </a:r>
             <a:r>
-              <a:rPr lang="fr-FR" sz="1200" dirty="0" smtClean="0"/>
+              <a:rPr lang="fr-FR" sz="1200" dirty="0"/>
               <a:t>\xe9e en raison de </a:t>
             </a:r>
           </a:p>
           <a:p>
             <a:r>
-              <a:rPr lang="fr-FR" sz="1200" dirty="0" smtClean="0"/>
+              <a:rPr lang="fr-FR" sz="1200" dirty="0"/>
               <a:t>l\x92arr\</a:t>
             </a:r>
             <a:r>
-              <a:rPr lang="fr-FR" sz="1200" dirty="0" err="1" smtClean="0"/>
+              <a:rPr lang="fr-FR" sz="1200" dirty="0" err="1"/>
               <a:t>xeat</a:t>
             </a:r>
             <a:r>
-              <a:rPr lang="fr-FR" sz="1200" dirty="0" smtClean="0"/>
+              <a:rPr lang="fr-FR" sz="1200" dirty="0"/>
               <a:t> d\x92un thread ou \xe0 la demande d\x92une application.\r\n\n'</a:t>
             </a:r>
-            <a:endParaRPr lang="fr-FR" sz="1200" dirty="0"/>
           </a:p>
         </p:txBody>
       </p:sp>
@@ -6167,10 +6032,9 @@
           <a:lstStyle/>
           <a:p>
             <a:r>
-              <a:rPr lang="fr-FR" sz="3200" dirty="0" smtClean="0"/>
+              <a:rPr lang="fr-FR" sz="3200" dirty="0"/>
               <a:t>Guide Utilisateur Interface</a:t>
             </a:r>
-            <a:endParaRPr lang="fr-FR" sz="3200" dirty="0"/>
           </a:p>
         </p:txBody>
       </p:sp>
@@ -6269,7 +6133,7 @@
           <a:p>
             <a:pPr algn="ctr"/>
             <a:r>
-              <a:rPr lang="fr-FR" sz="2000" b="1" dirty="0" smtClean="0">
+              <a:rPr lang="fr-FR" sz="2000" b="1" dirty="0">
                 <a:solidFill>
                   <a:schemeClr val="tx1">
                     <a:lumMod val="65000"/>
@@ -6279,14 +6143,6 @@
               </a:rPr>
               <a:t>Microscope à Illumination Structurée</a:t>
             </a:r>
-            <a:endParaRPr lang="fr-FR" sz="2000" b="1" dirty="0">
-              <a:solidFill>
-                <a:schemeClr val="tx1">
-                  <a:lumMod val="65000"/>
-                  <a:lumOff val="35000"/>
-                </a:schemeClr>
-              </a:solidFill>
-            </a:endParaRPr>
           </a:p>
         </p:txBody>
       </p:sp>
@@ -6349,7 +6205,7 @@
           <a:p>
             <a:pPr algn="ctr"/>
             <a:r>
-              <a:rPr lang="fr-FR" sz="1100" dirty="0" smtClean="0">
+              <a:rPr lang="fr-FR" sz="1100" dirty="0">
                 <a:solidFill>
                   <a:schemeClr val="tx1">
                     <a:lumMod val="65000"/>
@@ -6359,14 +6215,6 @@
               </a:rPr>
               <a:t>Interface réalisée par Romain Etienne / Promo 2025 – juin 2023</a:t>
             </a:r>
-            <a:endParaRPr lang="fr-FR" sz="1100" dirty="0">
-              <a:solidFill>
-                <a:schemeClr val="tx1">
-                  <a:lumMod val="65000"/>
-                  <a:lumOff val="35000"/>
-                </a:schemeClr>
-              </a:solidFill>
-            </a:endParaRPr>
           </a:p>
         </p:txBody>
       </p:sp>
@@ -6409,7 +6257,7 @@
           </a:lstStyle>
           <a:p>
             <a:r>
-              <a:rPr lang="fr-FR" sz="2400" b="1" dirty="0" smtClean="0">
+              <a:rPr lang="fr-FR" sz="2400" b="1" dirty="0">
                 <a:solidFill>
                   <a:schemeClr val="accent6">
                     <a:lumMod val="75000"/>
@@ -6418,13 +6266,6 @@
               </a:rPr>
               <a:t>Procédures de base</a:t>
             </a:r>
-            <a:endParaRPr lang="fr-FR" sz="2400" b="1" dirty="0">
-              <a:solidFill>
-                <a:schemeClr val="accent6">
-                  <a:lumMod val="75000"/>
-                </a:schemeClr>
-              </a:solidFill>
-            </a:endParaRPr>
           </a:p>
         </p:txBody>
       </p:sp>
@@ -6476,10 +6317,9 @@
           <a:lstStyle/>
           <a:p>
             <a:r>
-              <a:rPr lang="fr-FR" dirty="0" smtClean="0"/>
+              <a:rPr lang="fr-FR" dirty="0"/>
               <a:t>À l’égard des personnes encadrantes</a:t>
             </a:r>
-            <a:endParaRPr lang="fr-FR" dirty="0"/>
           </a:p>
         </p:txBody>
       </p:sp>
@@ -6501,46 +6341,46 @@
           <a:lstStyle/>
           <a:p>
             <a:r>
-              <a:rPr lang="fr-FR" dirty="0" smtClean="0"/>
+              <a:rPr lang="fr-FR" dirty="0"/>
               <a:t>Il est possible de charger des paramètres </a:t>
             </a:r>
             <a:r>
-              <a:rPr lang="fr-FR" dirty="0" err="1" smtClean="0"/>
+              <a:rPr lang="fr-FR" dirty="0" err="1"/>
               <a:t>pré-établis</a:t>
             </a:r>
             <a:r>
-              <a:rPr lang="fr-FR" dirty="0" smtClean="0"/>
+              <a:rPr lang="fr-FR" dirty="0"/>
               <a:t> pour faciliter le travail aux élèves, pour cela il suffit de ‘Save’ un ‘parameters.txt’ quelconque, puis de modifier les valeurs à la main, sur </a:t>
             </a:r>
             <a:r>
-              <a:rPr lang="fr-FR" dirty="0" err="1" smtClean="0"/>
+              <a:rPr lang="fr-FR" dirty="0" err="1"/>
               <a:t>Bloc-Note</a:t>
             </a:r>
             <a:r>
-              <a:rPr lang="fr-FR" dirty="0" smtClean="0"/>
+              <a:rPr lang="fr-FR" dirty="0"/>
               <a:t> par exemple</a:t>
             </a:r>
           </a:p>
           <a:p>
             <a:r>
-              <a:rPr lang="fr-FR" dirty="0" smtClean="0"/>
+              <a:rPr lang="fr-FR" dirty="0"/>
               <a:t>Les élèves n’auront qu’à prendre le fichier, le placer dans le ‘Directory’ choisit, et lancer l’acquisition avec ‘START’ sans changer les paramètres</a:t>
             </a:r>
           </a:p>
           <a:p>
             <a:r>
-              <a:rPr lang="fr-FR" dirty="0" smtClean="0"/>
+              <a:rPr lang="fr-FR" dirty="0"/>
               <a:t>Il est aussi possible de lancer des acquisitions à N ’patterns’, pour cela il suffit de rajouter des ‘patterns’ dans le fichier ‘parameters.txt’ de la même manière, selon la logique :</a:t>
             </a:r>
             <a:br>
-              <a:rPr lang="fr-FR" dirty="0" smtClean="0"/>
+              <a:rPr lang="fr-FR" dirty="0"/>
             </a:br>
             <a:r>
-              <a:rPr lang="fr-FR" dirty="0" smtClean="0"/>
+              <a:rPr lang="fr-FR" dirty="0"/>
               <a:t>	Pattern N : </a:t>
             </a:r>
             <a:r>
-              <a:rPr lang="fr-FR" dirty="0" err="1" smtClean="0"/>
+              <a:rPr lang="fr-FR" dirty="0" err="1"/>
               <a:t>path</a:t>
             </a:r>
             <a:endParaRPr lang="fr-FR" dirty="0"/>
@@ -6593,10 +6433,9 @@
           <a:lstStyle/>
           <a:p>
             <a:r>
-              <a:rPr lang="fr-FR" dirty="0" smtClean="0"/>
+              <a:rPr lang="fr-FR" dirty="0"/>
               <a:t>Au démarrage</a:t>
             </a:r>
-            <a:endParaRPr lang="fr-FR" dirty="0"/>
           </a:p>
         </p:txBody>
       </p:sp>
@@ -6618,38 +6457,37 @@
           <a:lstStyle/>
           <a:p>
             <a:r>
-              <a:rPr lang="fr-FR" dirty="0" smtClean="0"/>
+              <a:rPr lang="fr-FR" dirty="0"/>
               <a:t>Pour s’assurer du bon fonctionnement pour les élèves, il faut appuyer sur ‘</a:t>
             </a:r>
             <a:r>
-              <a:rPr lang="fr-FR" dirty="0" err="1" smtClean="0"/>
+              <a:rPr lang="fr-FR" dirty="0" err="1"/>
               <a:t>View</a:t>
             </a:r>
             <a:r>
-              <a:rPr lang="fr-FR" dirty="0" smtClean="0"/>
+              <a:rPr lang="fr-FR" dirty="0"/>
               <a:t> Test’ puis ‘TEST’ 8 :</a:t>
             </a:r>
           </a:p>
           <a:p>
             <a:r>
-              <a:rPr lang="fr-FR" dirty="0" smtClean="0"/>
+              <a:rPr lang="fr-FR" dirty="0"/>
               <a:t>S’il y a un bug comme indiqué page 6, il faut DMD Reset, l’interface va se fermer. Relancer la et réessayé jusqu’à ce que cela marche, normalement un essai suffit</a:t>
             </a:r>
           </a:p>
           <a:p>
             <a:r>
-              <a:rPr lang="fr-FR" dirty="0" smtClean="0"/>
+              <a:rPr lang="fr-FR" dirty="0"/>
               <a:t>Si l’image de ‘</a:t>
             </a:r>
             <a:r>
-              <a:rPr lang="fr-FR" dirty="0" err="1" smtClean="0"/>
+              <a:rPr lang="fr-FR" dirty="0" err="1"/>
               <a:t>View</a:t>
             </a:r>
             <a:r>
-              <a:rPr lang="fr-FR" dirty="0" smtClean="0"/>
+              <a:rPr lang="fr-FR" dirty="0"/>
               <a:t> Test’ et l’image sur le DMD ne correspondent pas, c’est qu’il doit y avoir un problème de DMD (jamais arrivé, mais on ne sait jamais)</a:t>
             </a:r>
-            <a:endParaRPr lang="fr-FR" dirty="0"/>
           </a:p>
         </p:txBody>
       </p:sp>
@@ -6699,10 +6537,9 @@
           <a:lstStyle/>
           <a:p>
             <a:r>
-              <a:rPr lang="fr-FR" dirty="0" smtClean="0"/>
+              <a:rPr lang="fr-FR" dirty="0"/>
               <a:t>Procédure standard – Manuelle</a:t>
             </a:r>
-            <a:endParaRPr lang="fr-FR" dirty="0"/>
           </a:p>
         </p:txBody>
       </p:sp>
@@ -6724,72 +6561,72 @@
           <a:lstStyle/>
           <a:p>
             <a:r>
-              <a:rPr lang="fr-FR" dirty="0" smtClean="0"/>
+              <a:rPr lang="fr-FR" dirty="0"/>
               <a:t>Lancer l’interface</a:t>
             </a:r>
           </a:p>
           <a:p>
             <a:r>
-              <a:rPr lang="fr-FR" dirty="0" smtClean="0"/>
+              <a:rPr lang="fr-FR" dirty="0"/>
               <a:t>Choisir ses paramètres caméra dans 6</a:t>
             </a:r>
           </a:p>
           <a:p>
             <a:r>
-              <a:rPr lang="fr-FR" dirty="0" smtClean="0"/>
+              <a:rPr lang="fr-FR" dirty="0"/>
               <a:t>Connecter le bon COM du </a:t>
             </a:r>
             <a:r>
-              <a:rPr lang="fr-FR" dirty="0" err="1" smtClean="0"/>
+              <a:rPr lang="fr-FR" dirty="0" err="1"/>
               <a:t>Piezo</a:t>
             </a:r>
             <a:r>
-              <a:rPr lang="fr-FR" dirty="0" smtClean="0"/>
+              <a:rPr lang="fr-FR" dirty="0"/>
               <a:t> puis cliquer sur ‘Connection’ 7 (si la LED devient rouge continuer)</a:t>
             </a:r>
           </a:p>
           <a:p>
             <a:r>
-              <a:rPr lang="fr-FR" dirty="0" smtClean="0"/>
+              <a:rPr lang="fr-FR" dirty="0"/>
               <a:t>Choisir ses patterns avec ‘</a:t>
             </a:r>
             <a:r>
-              <a:rPr lang="fr-FR" dirty="0" err="1" smtClean="0"/>
+              <a:rPr lang="fr-FR" dirty="0" err="1"/>
               <a:t>Choice</a:t>
             </a:r>
             <a:r>
-              <a:rPr lang="fr-FR" dirty="0" smtClean="0"/>
+              <a:rPr lang="fr-FR" dirty="0"/>
               <a:t> Pattern’ puis les ‘</a:t>
             </a:r>
             <a:r>
-              <a:rPr lang="fr-FR" dirty="0" err="1" smtClean="0"/>
+              <a:rPr lang="fr-FR" dirty="0" err="1"/>
               <a:t>Loads</a:t>
             </a:r>
             <a:r>
-              <a:rPr lang="fr-FR" dirty="0" smtClean="0"/>
+              <a:rPr lang="fr-FR" dirty="0"/>
               <a:t>’ 8</a:t>
             </a:r>
           </a:p>
           <a:p>
             <a:r>
-              <a:rPr lang="fr-FR" dirty="0" smtClean="0"/>
+              <a:rPr lang="fr-FR" dirty="0"/>
               <a:t>Choisir son positionnement 10</a:t>
             </a:r>
           </a:p>
           <a:p>
             <a:r>
-              <a:rPr lang="fr-FR" dirty="0" smtClean="0"/>
+              <a:rPr lang="fr-FR" dirty="0"/>
               <a:t>Choisir son emplacement de sauvegarde puis sauvegarder avec 3 et 4 quand l’image nous plaît</a:t>
             </a:r>
           </a:p>
           <a:p>
             <a:r>
-              <a:rPr lang="fr-FR" dirty="0" smtClean="0"/>
+              <a:rPr lang="fr-FR" dirty="0"/>
               <a:t>Recommencer</a:t>
             </a:r>
           </a:p>
           <a:p>
-            <a:endParaRPr lang="fr-FR" dirty="0" smtClean="0"/>
+            <a:endParaRPr lang="fr-FR" dirty="0"/>
           </a:p>
           <a:p>
             <a:endParaRPr lang="fr-FR" dirty="0"/>
@@ -6842,10 +6679,9 @@
           <a:lstStyle/>
           <a:p>
             <a:r>
-              <a:rPr lang="fr-FR" dirty="0" smtClean="0"/>
+              <a:rPr lang="fr-FR" dirty="0"/>
               <a:t>Procédure standard - Automatique</a:t>
             </a:r>
-            <a:endParaRPr lang="fr-FR" dirty="0"/>
           </a:p>
         </p:txBody>
       </p:sp>
@@ -6867,61 +6703,61 @@
           <a:lstStyle/>
           <a:p>
             <a:r>
-              <a:rPr lang="fr-FR" dirty="0" smtClean="0"/>
+              <a:rPr lang="fr-FR" dirty="0"/>
               <a:t>Lancer l’interface</a:t>
             </a:r>
           </a:p>
           <a:p>
             <a:r>
-              <a:rPr lang="fr-FR" dirty="0" smtClean="0"/>
+              <a:rPr lang="fr-FR" dirty="0"/>
               <a:t>Choisir ses paramètres caméra dans 6</a:t>
             </a:r>
           </a:p>
           <a:p>
             <a:r>
-              <a:rPr lang="fr-FR" dirty="0" smtClean="0"/>
+              <a:rPr lang="fr-FR" dirty="0"/>
               <a:t>Choisir ses patterns dans 8, pas besoin de les ‘</a:t>
             </a:r>
             <a:r>
-              <a:rPr lang="fr-FR" dirty="0" err="1" smtClean="0"/>
+              <a:rPr lang="fr-FR" dirty="0" err="1"/>
               <a:t>Load</a:t>
             </a:r>
             <a:r>
-              <a:rPr lang="fr-FR" dirty="0" smtClean="0"/>
+              <a:rPr lang="fr-FR" dirty="0"/>
               <a:t>’</a:t>
             </a:r>
           </a:p>
           <a:p>
             <a:r>
-              <a:rPr lang="fr-FR" dirty="0" smtClean="0"/>
+              <a:rPr lang="fr-FR" dirty="0"/>
               <a:t>Passer en mode ‘</a:t>
             </a:r>
             <a:r>
-              <a:rPr lang="fr-FR" dirty="0" err="1" smtClean="0"/>
+              <a:rPr lang="fr-FR" dirty="0" err="1"/>
               <a:t>Automatic</a:t>
             </a:r>
             <a:r>
-              <a:rPr lang="fr-FR" dirty="0" smtClean="0"/>
+              <a:rPr lang="fr-FR" dirty="0"/>
               <a:t>’ avec 1</a:t>
             </a:r>
           </a:p>
           <a:p>
             <a:r>
-              <a:rPr lang="fr-FR" dirty="0" smtClean="0"/>
+              <a:rPr lang="fr-FR" dirty="0"/>
               <a:t>Cliquer sur ‘</a:t>
             </a:r>
             <a:r>
-              <a:rPr lang="fr-FR" dirty="0" err="1" smtClean="0"/>
+              <a:rPr lang="fr-FR" dirty="0" err="1"/>
               <a:t>Parameters</a:t>
             </a:r>
             <a:r>
-              <a:rPr lang="fr-FR" dirty="0" smtClean="0"/>
+              <a:rPr lang="fr-FR" dirty="0"/>
               <a:t>’, 9,  puis entrer son emplacement de sauvegarde, sa plage et son pas</a:t>
             </a:r>
           </a:p>
           <a:p>
             <a:r>
-              <a:rPr lang="fr-FR" dirty="0" smtClean="0"/>
+              <a:rPr lang="fr-FR" dirty="0"/>
               <a:t>Lancer l’acquisition avec ‘Start’</a:t>
             </a:r>
           </a:p>
@@ -6986,10 +6822,9 @@
           <a:lstStyle/>
           <a:p>
             <a:r>
-              <a:rPr lang="fr-FR" sz="3200" dirty="0" smtClean="0"/>
+              <a:rPr lang="fr-FR" sz="3200" dirty="0"/>
               <a:t>Guide Utilisateur Interface</a:t>
             </a:r>
-            <a:endParaRPr lang="fr-FR" sz="3200" dirty="0"/>
           </a:p>
         </p:txBody>
       </p:sp>
@@ -7088,7 +6923,7 @@
           <a:p>
             <a:pPr algn="ctr"/>
             <a:r>
-              <a:rPr lang="fr-FR" sz="2000" b="1" dirty="0" smtClean="0">
+              <a:rPr lang="fr-FR" sz="2000" b="1" dirty="0">
                 <a:solidFill>
                   <a:schemeClr val="tx1">
                     <a:lumMod val="65000"/>
@@ -7098,14 +6933,6 @@
               </a:rPr>
               <a:t>Microscope à Illumination Structurée</a:t>
             </a:r>
-            <a:endParaRPr lang="fr-FR" sz="2000" b="1" dirty="0">
-              <a:solidFill>
-                <a:schemeClr val="tx1">
-                  <a:lumMod val="65000"/>
-                  <a:lumOff val="35000"/>
-                </a:schemeClr>
-              </a:solidFill>
-            </a:endParaRPr>
           </a:p>
         </p:txBody>
       </p:sp>
@@ -7168,7 +6995,7 @@
           <a:p>
             <a:pPr algn="ctr"/>
             <a:r>
-              <a:rPr lang="fr-FR" sz="1100" dirty="0" smtClean="0">
+              <a:rPr lang="fr-FR" sz="1100" dirty="0">
                 <a:solidFill>
                   <a:schemeClr val="tx1">
                     <a:lumMod val="65000"/>
@@ -7178,14 +7005,6 @@
               </a:rPr>
               <a:t>Interface réalisée par Romain Etienne / Promo 2025 – juin 2023</a:t>
             </a:r>
-            <a:endParaRPr lang="fr-FR" sz="1100" dirty="0">
-              <a:solidFill>
-                <a:schemeClr val="tx1">
-                  <a:lumMod val="65000"/>
-                  <a:lumOff val="35000"/>
-                </a:schemeClr>
-              </a:solidFill>
-            </a:endParaRPr>
           </a:p>
         </p:txBody>
       </p:sp>
@@ -7228,7 +7047,7 @@
           </a:lstStyle>
           <a:p>
             <a:r>
-              <a:rPr lang="fr-FR" sz="2400" b="1" dirty="0" smtClean="0">
+              <a:rPr lang="fr-FR" sz="2400" b="1" dirty="0">
                 <a:solidFill>
                   <a:schemeClr val="accent6">
                     <a:lumMod val="75000"/>
@@ -7237,13 +7056,6 @@
               </a:rPr>
               <a:t>Procédure Installation</a:t>
             </a:r>
-            <a:endParaRPr lang="fr-FR" sz="2400" b="1" dirty="0">
-              <a:solidFill>
-                <a:schemeClr val="accent6">
-                  <a:lumMod val="75000"/>
-                </a:schemeClr>
-              </a:solidFill>
-            </a:endParaRPr>
           </a:p>
         </p:txBody>
       </p:sp>
@@ -7300,10 +7112,9 @@
           <a:lstStyle/>
           <a:p>
             <a:r>
-              <a:rPr lang="fr-FR" sz="3200" dirty="0" smtClean="0"/>
+              <a:rPr lang="fr-FR" sz="3200" dirty="0"/>
               <a:t>Guide Utilisateur Interface</a:t>
             </a:r>
-            <a:endParaRPr lang="fr-FR" sz="3200" dirty="0"/>
           </a:p>
         </p:txBody>
       </p:sp>
@@ -7402,7 +7213,7 @@
           <a:p>
             <a:pPr algn="ctr"/>
             <a:r>
-              <a:rPr lang="fr-FR" sz="2000" b="1" dirty="0" smtClean="0">
+              <a:rPr lang="fr-FR" sz="2000" b="1" dirty="0">
                 <a:solidFill>
                   <a:schemeClr val="tx1">
                     <a:lumMod val="65000"/>
@@ -7412,14 +7223,6 @@
               </a:rPr>
               <a:t>Microscope à Illumination Structurée</a:t>
             </a:r>
-            <a:endParaRPr lang="fr-FR" sz="2000" b="1" dirty="0">
-              <a:solidFill>
-                <a:schemeClr val="tx1">
-                  <a:lumMod val="65000"/>
-                  <a:lumOff val="35000"/>
-                </a:schemeClr>
-              </a:solidFill>
-            </a:endParaRPr>
           </a:p>
         </p:txBody>
       </p:sp>
@@ -7482,7 +7285,7 @@
           <a:p>
             <a:pPr algn="ctr"/>
             <a:r>
-              <a:rPr lang="fr-FR" sz="1100" dirty="0" smtClean="0">
+              <a:rPr lang="fr-FR" sz="1100" dirty="0">
                 <a:solidFill>
                   <a:schemeClr val="tx1">
                     <a:lumMod val="65000"/>
@@ -7492,14 +7295,6 @@
               </a:rPr>
               <a:t>Interface réalisée par Romain Etienne / Promo 2025 – juin 2023</a:t>
             </a:r>
-            <a:endParaRPr lang="fr-FR" sz="1100" dirty="0">
-              <a:solidFill>
-                <a:schemeClr val="tx1">
-                  <a:lumMod val="65000"/>
-                  <a:lumOff val="35000"/>
-                </a:schemeClr>
-              </a:solidFill>
-            </a:endParaRPr>
           </a:p>
         </p:txBody>
       </p:sp>
@@ -7542,7 +7337,7 @@
           </a:lstStyle>
           <a:p>
             <a:r>
-              <a:rPr lang="fr-FR" sz="2400" b="1" dirty="0" smtClean="0">
+              <a:rPr lang="fr-FR" sz="2400" b="1" dirty="0">
                 <a:solidFill>
                   <a:schemeClr val="accent6">
                     <a:lumMod val="75000"/>
@@ -7551,13 +7346,6 @@
               </a:rPr>
               <a:t>Eléments de l’interface</a:t>
             </a:r>
-            <a:endParaRPr lang="fr-FR" sz="2400" b="1" dirty="0">
-              <a:solidFill>
-                <a:schemeClr val="accent6">
-                  <a:lumMod val="75000"/>
-                </a:schemeClr>
-              </a:solidFill>
-            </a:endParaRPr>
           </a:p>
         </p:txBody>
       </p:sp>
@@ -7656,7 +7444,7 @@
           <a:p>
             <a:pPr algn="ctr"/>
             <a:r>
-              <a:rPr lang="fr-FR" sz="2000" b="1" dirty="0" smtClean="0">
+              <a:rPr lang="fr-FR" sz="2000" b="1" dirty="0">
                 <a:solidFill>
                   <a:schemeClr val="tx1">
                     <a:lumMod val="65000"/>
@@ -7666,14 +7454,6 @@
               </a:rPr>
               <a:t>Microscope à Illumination Structurée</a:t>
             </a:r>
-            <a:endParaRPr lang="fr-FR" sz="2000" b="1" dirty="0">
-              <a:solidFill>
-                <a:schemeClr val="tx1">
-                  <a:lumMod val="65000"/>
-                  <a:lumOff val="35000"/>
-                </a:schemeClr>
-              </a:solidFill>
-            </a:endParaRPr>
           </a:p>
         </p:txBody>
       </p:sp>
@@ -7721,7 +7501,7 @@
         <p:spPr>
           <a:xfrm>
             <a:off x="395536" y="1268760"/>
-            <a:ext cx="8208912" cy="3539430"/>
+            <a:ext cx="8208912" cy="3785652"/>
           </a:xfrm>
           <a:prstGeom prst="rect">
             <a:avLst/>
@@ -7735,7 +7515,7 @@
           <a:lstStyle/>
           <a:p>
             <a:r>
-              <a:rPr lang="fr-FR" sz="1600" b="1" dirty="0" smtClean="0">
+              <a:rPr lang="fr-FR" sz="1600" b="1" dirty="0">
                 <a:solidFill>
                   <a:schemeClr val="accent6">
                     <a:lumMod val="75000"/>
@@ -7750,29 +7530,29 @@
           </a:p>
           <a:p>
             <a:r>
-              <a:rPr lang="fr-FR" sz="1600" dirty="0" smtClean="0"/>
+              <a:rPr lang="fr-FR" sz="1600" dirty="0"/>
               <a:t>Une distribution </a:t>
             </a:r>
             <a:r>
-              <a:rPr lang="fr-FR" sz="1600" b="1" dirty="0" smtClean="0"/>
+              <a:rPr lang="fr-FR" sz="1600" b="1" dirty="0"/>
               <a:t>Python 3.11 </a:t>
             </a:r>
             <a:r>
-              <a:rPr lang="fr-FR" sz="1600" dirty="0" smtClean="0"/>
+              <a:rPr lang="fr-FR" sz="1600" dirty="0"/>
               <a:t>(minimum) doit être installée sur le PC.</a:t>
             </a:r>
           </a:p>
           <a:p>
             <a:r>
-              <a:rPr lang="fr-FR" sz="1600" dirty="0" smtClean="0"/>
+              <a:rPr lang="fr-FR" sz="1600" dirty="0"/>
               <a:t>Les </a:t>
             </a:r>
             <a:r>
-              <a:rPr lang="fr-FR" sz="1600" b="1" dirty="0" smtClean="0"/>
+              <a:rPr lang="fr-FR" sz="1600" b="1" dirty="0"/>
               <a:t>dépendances</a:t>
             </a:r>
             <a:r>
-              <a:rPr lang="fr-FR" sz="1600" dirty="0" smtClean="0"/>
+              <a:rPr lang="fr-FR" sz="1600" dirty="0"/>
               <a:t> suivantes doivent également être satisfaites :</a:t>
             </a:r>
           </a:p>
@@ -7782,10 +7562,10 @@
               <a:buChar char="-"/>
             </a:pPr>
             <a:r>
-              <a:rPr lang="fr-FR" sz="1600" dirty="0" err="1" smtClean="0"/>
+              <a:rPr lang="fr-FR" sz="1600" dirty="0" err="1"/>
               <a:t>numpy</a:t>
             </a:r>
-            <a:endParaRPr lang="fr-FR" sz="1600" dirty="0" smtClean="0"/>
+            <a:endParaRPr lang="fr-FR" sz="1600" dirty="0"/>
           </a:p>
           <a:p>
             <a:pPr marL="285750" indent="-285750">
@@ -7793,7 +7573,7 @@
               <a:buChar char="-"/>
             </a:pPr>
             <a:r>
-              <a:rPr lang="fr-FR" sz="1600" dirty="0" smtClean="0"/>
+              <a:rPr lang="fr-FR" sz="1600" dirty="0"/>
               <a:t>pyqt5</a:t>
             </a:r>
           </a:p>
@@ -7803,11 +7583,11 @@
               <a:buChar char="-"/>
             </a:pPr>
             <a:r>
-              <a:rPr lang="fr-FR" sz="1600" dirty="0" err="1" smtClean="0"/>
+              <a:rPr lang="fr-FR" sz="1600" dirty="0" err="1"/>
               <a:t>opencv</a:t>
             </a:r>
             <a:r>
-              <a:rPr lang="fr-FR" sz="1600" dirty="0" smtClean="0"/>
+              <a:rPr lang="fr-FR" sz="1600" dirty="0"/>
               <a:t>-python</a:t>
             </a:r>
           </a:p>
@@ -7818,13 +7598,9 @@
             </a:pPr>
             <a:r>
               <a:rPr lang="fr-FR" sz="1600" dirty="0" err="1"/>
-              <a:t>p</a:t>
-            </a:r>
-            <a:r>
-              <a:rPr lang="fr-FR" sz="1600" dirty="0" err="1" smtClean="0"/>
-              <a:t>yserial</a:t>
-            </a:r>
-            <a:endParaRPr lang="fr-FR" sz="1600" dirty="0" smtClean="0"/>
+              <a:t>pyserial</a:t>
+            </a:r>
+            <a:endParaRPr lang="fr-FR" sz="1600" dirty="0"/>
           </a:p>
           <a:p>
             <a:pPr marL="285750" indent="-285750">
@@ -7833,13 +7609,9 @@
             </a:pPr>
             <a:r>
               <a:rPr lang="fr-FR" sz="1600" dirty="0" err="1"/>
-              <a:t>p</a:t>
-            </a:r>
-            <a:r>
-              <a:rPr lang="fr-FR" sz="1600" dirty="0" err="1" smtClean="0"/>
-              <a:t>yusb</a:t>
-            </a:r>
-            <a:endParaRPr lang="fr-FR" sz="1600" dirty="0" smtClean="0"/>
+              <a:t>pyusb</a:t>
+            </a:r>
+            <a:endParaRPr lang="fr-FR" sz="1600" dirty="0"/>
           </a:p>
           <a:p>
             <a:pPr marL="285750" indent="-285750">
@@ -7848,13 +7620,9 @@
             </a:pPr>
             <a:r>
               <a:rPr lang="fr-FR" sz="1600" dirty="0" err="1"/>
-              <a:t>q</a:t>
-            </a:r>
-            <a:r>
-              <a:rPr lang="fr-FR" sz="1600" dirty="0" err="1" smtClean="0"/>
-              <a:t>tpy</a:t>
-            </a:r>
-            <a:endParaRPr lang="fr-FR" sz="1600" dirty="0" smtClean="0"/>
+              <a:t>qtpy</a:t>
+            </a:r>
+            <a:endParaRPr lang="fr-FR" sz="1600" dirty="0"/>
           </a:p>
           <a:p>
             <a:pPr marL="285750" indent="-285750">
@@ -7862,40 +7630,61 @@
               <a:buChar char="-"/>
             </a:pPr>
             <a:r>
-              <a:rPr lang="fr-FR" sz="1600" dirty="0" err="1" smtClean="0"/>
-              <a:t>Pillow</a:t>
-            </a:r>
-            <a:endParaRPr lang="fr-FR" sz="1600" dirty="0" smtClean="0"/>
-          </a:p>
-          <a:p>
-            <a:endParaRPr lang="fr-FR" sz="1600" dirty="0" smtClean="0"/>
-          </a:p>
-          <a:p>
-            <a:r>
-              <a:rPr lang="fr-FR" sz="1600" dirty="0" smtClean="0"/>
+              <a:rPr lang="fr-FR" sz="1600" dirty="0" err="1"/>
+              <a:t>pillow</a:t>
+            </a:r>
+            <a:endParaRPr lang="fr-FR" sz="1600" dirty="0"/>
+          </a:p>
+          <a:p>
+            <a:pPr marL="285750" indent="-285750">
+              <a:buFontTx/>
+              <a:buChar char="-"/>
+            </a:pPr>
+            <a:r>
+              <a:rPr lang="fr-FR" sz="1600" dirty="0" err="1"/>
+              <a:t>pypylon</a:t>
+            </a:r>
+            <a:r>
+              <a:rPr lang="fr-FR" sz="1600" dirty="0"/>
+              <a:t> (</a:t>
+            </a:r>
+            <a:r>
+              <a:rPr lang="fr-FR" sz="1600" dirty="0" err="1"/>
+              <a:t>Basler</a:t>
+            </a:r>
+            <a:r>
+              <a:rPr lang="fr-FR" sz="1600" dirty="0"/>
+              <a:t> Camera)</a:t>
+            </a:r>
+          </a:p>
+          <a:p>
+            <a:endParaRPr lang="fr-FR" sz="1600" dirty="0"/>
+          </a:p>
+          <a:p>
+            <a:r>
+              <a:rPr lang="fr-FR" sz="1600" dirty="0"/>
               <a:t>Vous pouvez installer ces dépendances par l’intermédiaire de la commande </a:t>
             </a:r>
             <a:r>
-              <a:rPr lang="fr-FR" sz="1600" b="1" dirty="0" err="1" smtClean="0"/>
+              <a:rPr lang="fr-FR" sz="1600" b="1" dirty="0" err="1"/>
               <a:t>pip</a:t>
             </a:r>
             <a:r>
-              <a:rPr lang="fr-FR" sz="1600" b="1" dirty="0" smtClean="0"/>
+              <a:rPr lang="fr-FR" sz="1600" b="1" dirty="0"/>
               <a:t> </a:t>
             </a:r>
             <a:r>
-              <a:rPr lang="fr-FR" sz="1600" b="1" dirty="0" err="1" smtClean="0"/>
+              <a:rPr lang="fr-FR" sz="1600" b="1" dirty="0" err="1"/>
               <a:t>install</a:t>
             </a:r>
             <a:r>
-              <a:rPr lang="fr-FR" sz="1600" b="1" dirty="0" smtClean="0"/>
+              <a:rPr lang="fr-FR" sz="1600" b="1" dirty="0"/>
               <a:t> package</a:t>
             </a:r>
             <a:r>
-              <a:rPr lang="fr-FR" sz="1600" dirty="0" smtClean="0"/>
+              <a:rPr lang="fr-FR" sz="1600" dirty="0"/>
               <a:t>.</a:t>
             </a:r>
-            <a:endParaRPr lang="fr-FR" sz="1600" dirty="0"/>
           </a:p>
           <a:p>
             <a:pPr marL="285750" indent="-285750">
@@ -7928,7 +7717,7 @@
           <a:lstStyle/>
           <a:p>
             <a:r>
-              <a:rPr lang="fr-FR" b="1" dirty="0" smtClean="0">
+              <a:rPr lang="fr-FR" b="1" dirty="0">
                 <a:solidFill>
                   <a:schemeClr val="accent6">
                     <a:lumMod val="75000"/>
@@ -7937,49 +7726,41 @@
               </a:rPr>
               <a:t>RECUPERATION DES FICHIERS</a:t>
             </a:r>
-            <a:endParaRPr lang="fr-FR" b="1" dirty="0">
-              <a:solidFill>
-                <a:schemeClr val="accent6">
-                  <a:lumMod val="75000"/>
-                </a:schemeClr>
-              </a:solidFill>
-            </a:endParaRPr>
-          </a:p>
-          <a:p>
-            <a:endParaRPr lang="fr-FR" dirty="0" smtClean="0"/>
-          </a:p>
-          <a:p>
-            <a:r>
-              <a:rPr lang="fr-FR" dirty="0" smtClean="0"/>
+          </a:p>
+          <a:p>
+            <a:endParaRPr lang="fr-FR" dirty="0"/>
+          </a:p>
+          <a:p>
+            <a:r>
+              <a:rPr lang="fr-FR" dirty="0"/>
               <a:t>Les fichiers se trouvent pour l’instant dans le dépôt </a:t>
             </a:r>
             <a:r>
-              <a:rPr lang="fr-FR" dirty="0" err="1" smtClean="0"/>
+              <a:rPr lang="fr-FR" b="1" dirty="0" err="1"/>
               <a:t>GitHub</a:t>
             </a:r>
             <a:r>
-              <a:rPr lang="fr-FR" dirty="0" smtClean="0"/>
+              <a:rPr lang="fr-FR" dirty="0"/>
               <a:t> suivant : </a:t>
             </a:r>
             <a:r>
-              <a:rPr lang="fr-FR" dirty="0"/>
+              <a:rPr lang="fr-FR" b="1" dirty="0"/>
               <a:t>https://github.com/IOGS-LEnsE/labwork-GUI</a:t>
             </a:r>
           </a:p>
           <a:p>
             <a:r>
-              <a:rPr lang="fr-FR" dirty="0" smtClean="0"/>
+              <a:rPr lang="fr-FR" dirty="0"/>
               <a:t>Dans la rubrique </a:t>
             </a:r>
             <a:r>
-              <a:rPr lang="fr-FR" dirty="0" err="1" smtClean="0"/>
+              <a:rPr lang="fr-FR" dirty="0" err="1"/>
               <a:t>BioPhot</a:t>
             </a:r>
             <a:r>
-              <a:rPr lang="fr-FR" dirty="0" smtClean="0"/>
+              <a:rPr lang="fr-FR" dirty="0"/>
               <a:t> /  </a:t>
             </a:r>
-            <a:endParaRPr lang="fr-FR" dirty="0"/>
           </a:p>
         </p:txBody>
       </p:sp>
@@ -8401,18 +8182,13 @@
           <a:lstStyle/>
           <a:p>
             <a:r>
-              <a:rPr lang="fr-FR" dirty="0" smtClean="0">
+              <a:rPr lang="fr-FR" dirty="0">
                 <a:solidFill>
                   <a:srgbClr val="7030A0"/>
                 </a:solidFill>
               </a:rPr>
               <a:t>2</a:t>
             </a:r>
-            <a:endParaRPr lang="fr-FR" dirty="0">
-              <a:solidFill>
-                <a:srgbClr val="7030A0"/>
-              </a:solidFill>
-            </a:endParaRPr>
           </a:p>
         </p:txBody>
       </p:sp>
@@ -8439,18 +8215,13 @@
           <a:lstStyle/>
           <a:p>
             <a:r>
-              <a:rPr lang="fr-FR" dirty="0" smtClean="0">
+              <a:rPr lang="fr-FR" dirty="0">
                 <a:solidFill>
                   <a:srgbClr val="7030A0"/>
                 </a:solidFill>
               </a:rPr>
               <a:t>3</a:t>
             </a:r>
-            <a:endParaRPr lang="fr-FR" dirty="0">
-              <a:solidFill>
-                <a:srgbClr val="7030A0"/>
-              </a:solidFill>
-            </a:endParaRPr>
           </a:p>
         </p:txBody>
       </p:sp>
@@ -8477,18 +8248,13 @@
           <a:lstStyle/>
           <a:p>
             <a:r>
-              <a:rPr lang="fr-FR" dirty="0" smtClean="0">
+              <a:rPr lang="fr-FR" dirty="0">
                 <a:solidFill>
                   <a:srgbClr val="7030A0"/>
                 </a:solidFill>
               </a:rPr>
               <a:t>4</a:t>
             </a:r>
-            <a:endParaRPr lang="fr-FR" dirty="0">
-              <a:solidFill>
-                <a:srgbClr val="7030A0"/>
-              </a:solidFill>
-            </a:endParaRPr>
           </a:p>
         </p:txBody>
       </p:sp>
@@ -8551,18 +8317,13 @@
           <a:lstStyle/>
           <a:p>
             <a:r>
-              <a:rPr lang="fr-FR" dirty="0" smtClean="0">
+              <a:rPr lang="fr-FR" dirty="0">
                 <a:solidFill>
                   <a:srgbClr val="7030A0"/>
                 </a:solidFill>
               </a:rPr>
               <a:t>5</a:t>
             </a:r>
-            <a:endParaRPr lang="fr-FR" dirty="0">
-              <a:solidFill>
-                <a:srgbClr val="7030A0"/>
-              </a:solidFill>
-            </a:endParaRPr>
           </a:p>
         </p:txBody>
       </p:sp>
@@ -8589,18 +8350,13 @@
           <a:lstStyle/>
           <a:p>
             <a:r>
-              <a:rPr lang="fr-FR" dirty="0" smtClean="0">
+              <a:rPr lang="fr-FR" dirty="0">
                 <a:solidFill>
                   <a:srgbClr val="7030A0"/>
                 </a:solidFill>
               </a:rPr>
               <a:t>6</a:t>
             </a:r>
-            <a:endParaRPr lang="fr-FR" dirty="0">
-              <a:solidFill>
-                <a:srgbClr val="7030A0"/>
-              </a:solidFill>
-            </a:endParaRPr>
           </a:p>
         </p:txBody>
       </p:sp>
@@ -8627,18 +8383,13 @@
           <a:lstStyle/>
           <a:p>
             <a:r>
-              <a:rPr lang="fr-FR" dirty="0" smtClean="0">
+              <a:rPr lang="fr-FR" dirty="0">
                 <a:solidFill>
                   <a:srgbClr val="7030A0"/>
                 </a:solidFill>
               </a:rPr>
               <a:t>7</a:t>
             </a:r>
-            <a:endParaRPr lang="fr-FR" dirty="0">
-              <a:solidFill>
-                <a:srgbClr val="7030A0"/>
-              </a:solidFill>
-            </a:endParaRPr>
           </a:p>
         </p:txBody>
       </p:sp>
@@ -8665,18 +8416,13 @@
           <a:lstStyle/>
           <a:p>
             <a:r>
-              <a:rPr lang="fr-FR" dirty="0" smtClean="0">
+              <a:rPr lang="fr-FR" dirty="0">
                 <a:solidFill>
                   <a:srgbClr val="7030A0"/>
                 </a:solidFill>
               </a:rPr>
               <a:t>8</a:t>
             </a:r>
-            <a:endParaRPr lang="fr-FR" dirty="0">
-              <a:solidFill>
-                <a:srgbClr val="7030A0"/>
-              </a:solidFill>
-            </a:endParaRPr>
           </a:p>
         </p:txBody>
       </p:sp>
@@ -8703,18 +8449,13 @@
           <a:lstStyle/>
           <a:p>
             <a:r>
-              <a:rPr lang="fr-FR" dirty="0" smtClean="0">
+              <a:rPr lang="fr-FR" dirty="0">
                 <a:solidFill>
                   <a:srgbClr val="7030A0"/>
                 </a:solidFill>
               </a:rPr>
               <a:t>9</a:t>
             </a:r>
-            <a:endParaRPr lang="fr-FR" dirty="0">
-              <a:solidFill>
-                <a:srgbClr val="7030A0"/>
-              </a:solidFill>
-            </a:endParaRPr>
           </a:p>
         </p:txBody>
       </p:sp>
@@ -8741,18 +8482,13 @@
           <a:lstStyle/>
           <a:p>
             <a:r>
-              <a:rPr lang="fr-FR" dirty="0" smtClean="0">
+              <a:rPr lang="fr-FR" dirty="0">
                 <a:solidFill>
                   <a:srgbClr val="7030A0"/>
                 </a:solidFill>
               </a:rPr>
               <a:t>10</a:t>
             </a:r>
-            <a:endParaRPr lang="fr-FR" dirty="0">
-              <a:solidFill>
-                <a:srgbClr val="7030A0"/>
-              </a:solidFill>
-            </a:endParaRPr>
           </a:p>
         </p:txBody>
       </p:sp>
@@ -8821,7 +8557,7 @@
           <a:p>
             <a:pPr algn="ctr"/>
             <a:r>
-              <a:rPr lang="fr-FR" sz="2000" b="1" dirty="0" smtClean="0">
+              <a:rPr lang="fr-FR" sz="2000" b="1" dirty="0">
                 <a:solidFill>
                   <a:schemeClr val="tx1">
                     <a:lumMod val="65000"/>
@@ -8831,14 +8567,6 @@
               </a:rPr>
               <a:t>Microscope à Illumination Structurée</a:t>
             </a:r>
-            <a:endParaRPr lang="fr-FR" sz="2000" b="1" dirty="0">
-              <a:solidFill>
-                <a:schemeClr val="tx1">
-                  <a:lumMod val="65000"/>
-                  <a:lumOff val="35000"/>
-                </a:schemeClr>
-              </a:solidFill>
-            </a:endParaRPr>
           </a:p>
         </p:txBody>
       </p:sp>
@@ -8901,7 +8629,7 @@
           <a:p>
             <a:pPr algn="r"/>
             <a:r>
-              <a:rPr lang="fr-FR" sz="2000" b="1" dirty="0" smtClean="0">
+              <a:rPr lang="fr-FR" sz="2000" b="1" dirty="0">
                 <a:solidFill>
                   <a:schemeClr val="accent4">
                     <a:lumMod val="75000"/>
@@ -8910,13 +8638,6 @@
               </a:rPr>
               <a:t>Mode Manuel</a:t>
             </a:r>
-            <a:endParaRPr lang="fr-FR" sz="2000" b="1" dirty="0">
-              <a:solidFill>
-                <a:schemeClr val="accent4">
-                  <a:lumMod val="75000"/>
-                </a:schemeClr>
-              </a:solidFill>
-            </a:endParaRPr>
           </a:p>
         </p:txBody>
       </p:sp>
@@ -8979,18 +8700,13 @@
           <a:lstStyle/>
           <a:p>
             <a:r>
-              <a:rPr lang="fr-FR" dirty="0" smtClean="0">
+              <a:rPr lang="fr-FR" dirty="0">
                 <a:solidFill>
                   <a:srgbClr val="7030A0"/>
                 </a:solidFill>
               </a:rPr>
               <a:t>1</a:t>
             </a:r>
-            <a:endParaRPr lang="fr-FR" dirty="0">
-              <a:solidFill>
-                <a:srgbClr val="7030A0"/>
-              </a:solidFill>
-            </a:endParaRPr>
           </a:p>
         </p:txBody>
       </p:sp>
@@ -9376,18 +9092,13 @@
           <a:lstStyle/>
           <a:p>
             <a:r>
-              <a:rPr lang="fr-FR" dirty="0" smtClean="0">
+              <a:rPr lang="fr-FR" dirty="0">
                 <a:solidFill>
                   <a:srgbClr val="7030A0"/>
                 </a:solidFill>
               </a:rPr>
               <a:t>2</a:t>
             </a:r>
-            <a:endParaRPr lang="fr-FR" dirty="0">
-              <a:solidFill>
-                <a:srgbClr val="7030A0"/>
-              </a:solidFill>
-            </a:endParaRPr>
           </a:p>
         </p:txBody>
       </p:sp>
@@ -9414,18 +9125,13 @@
           <a:lstStyle/>
           <a:p>
             <a:r>
-              <a:rPr lang="fr-FR" dirty="0" smtClean="0">
+              <a:rPr lang="fr-FR" dirty="0">
                 <a:solidFill>
                   <a:srgbClr val="7030A0"/>
                 </a:solidFill>
               </a:rPr>
               <a:t>3</a:t>
             </a:r>
-            <a:endParaRPr lang="fr-FR" dirty="0">
-              <a:solidFill>
-                <a:srgbClr val="7030A0"/>
-              </a:solidFill>
-            </a:endParaRPr>
           </a:p>
         </p:txBody>
       </p:sp>
@@ -9452,18 +9158,13 @@
           <a:lstStyle/>
           <a:p>
             <a:r>
-              <a:rPr lang="fr-FR" dirty="0" smtClean="0">
+              <a:rPr lang="fr-FR" dirty="0">
                 <a:solidFill>
                   <a:srgbClr val="7030A0"/>
                 </a:solidFill>
               </a:rPr>
               <a:t>4</a:t>
             </a:r>
-            <a:endParaRPr lang="fr-FR" dirty="0">
-              <a:solidFill>
-                <a:srgbClr val="7030A0"/>
-              </a:solidFill>
-            </a:endParaRPr>
           </a:p>
         </p:txBody>
       </p:sp>
@@ -9526,18 +9227,13 @@
           <a:lstStyle/>
           <a:p>
             <a:r>
-              <a:rPr lang="fr-FR" dirty="0" smtClean="0">
+              <a:rPr lang="fr-FR" dirty="0">
                 <a:solidFill>
                   <a:srgbClr val="7030A0"/>
                 </a:solidFill>
               </a:rPr>
               <a:t>5</a:t>
             </a:r>
-            <a:endParaRPr lang="fr-FR" dirty="0">
-              <a:solidFill>
-                <a:srgbClr val="7030A0"/>
-              </a:solidFill>
-            </a:endParaRPr>
           </a:p>
         </p:txBody>
       </p:sp>
@@ -9564,18 +9260,13 @@
           <a:lstStyle/>
           <a:p>
             <a:r>
-              <a:rPr lang="fr-FR" dirty="0" smtClean="0">
+              <a:rPr lang="fr-FR" dirty="0">
                 <a:solidFill>
                   <a:srgbClr val="7030A0"/>
                 </a:solidFill>
               </a:rPr>
               <a:t>6</a:t>
             </a:r>
-            <a:endParaRPr lang="fr-FR" dirty="0">
-              <a:solidFill>
-                <a:srgbClr val="7030A0"/>
-              </a:solidFill>
-            </a:endParaRPr>
           </a:p>
         </p:txBody>
       </p:sp>
@@ -9602,18 +9293,13 @@
           <a:lstStyle/>
           <a:p>
             <a:r>
-              <a:rPr lang="fr-FR" dirty="0" smtClean="0">
+              <a:rPr lang="fr-FR" dirty="0">
                 <a:solidFill>
                   <a:srgbClr val="7030A0"/>
                 </a:solidFill>
               </a:rPr>
               <a:t>7</a:t>
             </a:r>
-            <a:endParaRPr lang="fr-FR" dirty="0">
-              <a:solidFill>
-                <a:srgbClr val="7030A0"/>
-              </a:solidFill>
-            </a:endParaRPr>
           </a:p>
         </p:txBody>
       </p:sp>
@@ -9640,18 +9326,13 @@
           <a:lstStyle/>
           <a:p>
             <a:r>
-              <a:rPr lang="fr-FR" dirty="0" smtClean="0">
+              <a:rPr lang="fr-FR" dirty="0">
                 <a:solidFill>
                   <a:srgbClr val="7030A0"/>
                 </a:solidFill>
               </a:rPr>
               <a:t>8</a:t>
             </a:r>
-            <a:endParaRPr lang="fr-FR" dirty="0">
-              <a:solidFill>
-                <a:srgbClr val="7030A0"/>
-              </a:solidFill>
-            </a:endParaRPr>
           </a:p>
         </p:txBody>
       </p:sp>
@@ -9678,18 +9359,13 @@
           <a:lstStyle/>
           <a:p>
             <a:r>
-              <a:rPr lang="fr-FR" dirty="0" smtClean="0">
+              <a:rPr lang="fr-FR" dirty="0">
                 <a:solidFill>
                   <a:srgbClr val="7030A0"/>
                 </a:solidFill>
               </a:rPr>
               <a:t>9</a:t>
             </a:r>
-            <a:endParaRPr lang="fr-FR" dirty="0">
-              <a:solidFill>
-                <a:srgbClr val="7030A0"/>
-              </a:solidFill>
-            </a:endParaRPr>
           </a:p>
         </p:txBody>
       </p:sp>
@@ -9716,18 +9392,13 @@
           <a:lstStyle/>
           <a:p>
             <a:r>
-              <a:rPr lang="fr-FR" dirty="0" smtClean="0">
+              <a:rPr lang="fr-FR" dirty="0">
                 <a:solidFill>
                   <a:srgbClr val="7030A0"/>
                 </a:solidFill>
               </a:rPr>
               <a:t>10</a:t>
             </a:r>
-            <a:endParaRPr lang="fr-FR" dirty="0">
-              <a:solidFill>
-                <a:srgbClr val="7030A0"/>
-              </a:solidFill>
-            </a:endParaRPr>
           </a:p>
         </p:txBody>
       </p:sp>
@@ -9796,7 +9467,7 @@
           <a:p>
             <a:pPr algn="ctr"/>
             <a:r>
-              <a:rPr lang="fr-FR" sz="2000" b="1" dirty="0" smtClean="0">
+              <a:rPr lang="fr-FR" sz="2000" b="1" dirty="0">
                 <a:solidFill>
                   <a:schemeClr val="tx1">
                     <a:lumMod val="65000"/>
@@ -9806,14 +9477,6 @@
               </a:rPr>
               <a:t>Microscope à Illumination Structurée</a:t>
             </a:r>
-            <a:endParaRPr lang="fr-FR" sz="2000" b="1" dirty="0">
-              <a:solidFill>
-                <a:schemeClr val="tx1">
-                  <a:lumMod val="65000"/>
-                  <a:lumOff val="35000"/>
-                </a:schemeClr>
-              </a:solidFill>
-            </a:endParaRPr>
           </a:p>
         </p:txBody>
       </p:sp>
@@ -9876,32 +9539,15 @@
           <a:p>
             <a:pPr algn="r"/>
             <a:r>
-              <a:rPr lang="fr-FR" sz="2000" b="1" dirty="0" smtClean="0">
+              <a:rPr lang="fr-FR" sz="2000" b="1" dirty="0">
                 <a:solidFill>
                   <a:schemeClr val="accent4">
                     <a:lumMod val="75000"/>
                   </a:schemeClr>
                 </a:solidFill>
               </a:rPr>
-              <a:t>Mode </a:t>
-            </a:r>
-            <a:r>
-              <a:rPr lang="fr-FR" sz="2000" b="1" dirty="0" smtClean="0">
-                <a:solidFill>
-                  <a:schemeClr val="accent4">
-                    <a:lumMod val="75000"/>
-                  </a:schemeClr>
-                </a:solidFill>
-              </a:rPr>
-              <a:t>Automatique</a:t>
-            </a:r>
-            <a:endParaRPr lang="fr-FR" sz="2000" b="1" dirty="0">
-              <a:solidFill>
-                <a:schemeClr val="accent4">
-                  <a:lumMod val="75000"/>
-                </a:schemeClr>
-              </a:solidFill>
-            </a:endParaRPr>
+              <a:t>Mode Automatique</a:t>
+            </a:r>
           </a:p>
         </p:txBody>
       </p:sp>
@@ -9964,18 +9610,13 @@
           <a:lstStyle/>
           <a:p>
             <a:r>
-              <a:rPr lang="fr-FR" dirty="0" smtClean="0">
+              <a:rPr lang="fr-FR" dirty="0">
                 <a:solidFill>
                   <a:srgbClr val="7030A0"/>
                 </a:solidFill>
               </a:rPr>
               <a:t>1</a:t>
             </a:r>
-            <a:endParaRPr lang="fr-FR" dirty="0">
-              <a:solidFill>
-                <a:srgbClr val="7030A0"/>
-              </a:solidFill>
-            </a:endParaRPr>
           </a:p>
         </p:txBody>
       </p:sp>
@@ -10032,10 +9673,9 @@
           <a:lstStyle/>
           <a:p>
             <a:r>
-              <a:rPr lang="fr-FR" sz="3200" dirty="0" smtClean="0"/>
+              <a:rPr lang="fr-FR" sz="3200" dirty="0"/>
               <a:t>Guide Utilisateur Interface</a:t>
             </a:r>
-            <a:endParaRPr lang="fr-FR" sz="3200" dirty="0"/>
           </a:p>
         </p:txBody>
       </p:sp>
@@ -10134,7 +9774,7 @@
           <a:p>
             <a:pPr algn="ctr"/>
             <a:r>
-              <a:rPr lang="fr-FR" sz="2000" b="1" dirty="0" smtClean="0">
+              <a:rPr lang="fr-FR" sz="2000" b="1" dirty="0">
                 <a:solidFill>
                   <a:schemeClr val="tx1">
                     <a:lumMod val="65000"/>
@@ -10144,14 +9784,6 @@
               </a:rPr>
               <a:t>Microscope à Illumination Structurée</a:t>
             </a:r>
-            <a:endParaRPr lang="fr-FR" sz="2000" b="1" dirty="0">
-              <a:solidFill>
-                <a:schemeClr val="tx1">
-                  <a:lumMod val="65000"/>
-                  <a:lumOff val="35000"/>
-                </a:schemeClr>
-              </a:solidFill>
-            </a:endParaRPr>
           </a:p>
         </p:txBody>
       </p:sp>
@@ -10214,7 +9846,7 @@
           <a:p>
             <a:pPr algn="ctr"/>
             <a:r>
-              <a:rPr lang="fr-FR" sz="1100" dirty="0" smtClean="0">
+              <a:rPr lang="fr-FR" sz="1100" dirty="0">
                 <a:solidFill>
                   <a:schemeClr val="tx1">
                     <a:lumMod val="65000"/>
@@ -10224,14 +9856,6 @@
               </a:rPr>
               <a:t>Interface réalisée par Romain Etienne / Promo 2025 – juin 2023</a:t>
             </a:r>
-            <a:endParaRPr lang="fr-FR" sz="1100" dirty="0">
-              <a:solidFill>
-                <a:schemeClr val="tx1">
-                  <a:lumMod val="65000"/>
-                  <a:lumOff val="35000"/>
-                </a:schemeClr>
-              </a:solidFill>
-            </a:endParaRPr>
           </a:p>
         </p:txBody>
       </p:sp>
@@ -10274,7 +9898,7 @@
           </a:lstStyle>
           <a:p>
             <a:r>
-              <a:rPr lang="fr-FR" sz="2400" b="1" dirty="0" smtClean="0">
+              <a:rPr lang="fr-FR" sz="2400" b="1" dirty="0">
                 <a:solidFill>
                   <a:schemeClr val="accent6">
                     <a:lumMod val="75000"/>
@@ -10283,13 +9907,6 @@
               </a:rPr>
               <a:t>Modes de fonctionnement / Paramètres globaux</a:t>
             </a:r>
-            <a:endParaRPr lang="fr-FR" sz="2400" b="1" dirty="0">
-              <a:solidFill>
-                <a:schemeClr val="accent6">
-                  <a:lumMod val="75000"/>
-                </a:schemeClr>
-              </a:solidFill>
-            </a:endParaRPr>
           </a:p>
         </p:txBody>
       </p:sp>
@@ -10388,7 +10005,7 @@
           <a:p>
             <a:pPr algn="ctr"/>
             <a:r>
-              <a:rPr lang="fr-FR" sz="2000" b="1" dirty="0" smtClean="0">
+              <a:rPr lang="fr-FR" sz="2000" b="1" dirty="0">
                 <a:solidFill>
                   <a:schemeClr val="tx1">
                     <a:lumMod val="65000"/>
@@ -10398,14 +10015,6 @@
               </a:rPr>
               <a:t>Microscope à Illumination Structurée</a:t>
             </a:r>
-            <a:endParaRPr lang="fr-FR" sz="2000" b="1" dirty="0">
-              <a:solidFill>
-                <a:schemeClr val="tx1">
-                  <a:lumMod val="65000"/>
-                  <a:lumOff val="35000"/>
-                </a:schemeClr>
-              </a:solidFill>
-            </a:endParaRPr>
           </a:p>
         </p:txBody>
       </p:sp>
@@ -10468,7 +10077,7 @@
           <a:p>
             <a:pPr algn="r"/>
             <a:r>
-              <a:rPr lang="fr-FR" sz="2000" b="1" dirty="0" smtClean="0">
+              <a:rPr lang="fr-FR" sz="2000" b="1" dirty="0">
                 <a:solidFill>
                   <a:schemeClr val="accent4">
                     <a:lumMod val="75000"/>
@@ -10477,13 +10086,6 @@
               </a:rPr>
               <a:t>Sélection du mode de fonctionnement</a:t>
             </a:r>
-            <a:endParaRPr lang="fr-FR" sz="2000" b="1" dirty="0">
-              <a:solidFill>
-                <a:schemeClr val="accent4">
-                  <a:lumMod val="75000"/>
-                </a:schemeClr>
-              </a:solidFill>
-            </a:endParaRPr>
           </a:p>
         </p:txBody>
       </p:sp>
@@ -10510,37 +10112,35 @@
           <a:lstStyle/>
           <a:p>
             <a:r>
-              <a:rPr lang="fr-FR" dirty="0" smtClean="0"/>
+              <a:rPr lang="fr-FR" dirty="0"/>
               <a:t>Deux modes de fonctionnement sont proposés par l’interface de pilotage.</a:t>
             </a:r>
           </a:p>
           <a:p>
             <a:r>
-              <a:rPr lang="fr-FR" dirty="0" smtClean="0"/>
+              <a:rPr lang="fr-FR" dirty="0"/>
               <a:t>Ce choix se fait à l’aide du sélecteur (</a:t>
             </a:r>
             <a:r>
-              <a:rPr lang="fr-FR" b="1" dirty="0" smtClean="0"/>
+              <a:rPr lang="fr-FR" b="1" dirty="0"/>
               <a:t>1</a:t>
             </a:r>
             <a:r>
-              <a:rPr lang="fr-FR" dirty="0" smtClean="0"/>
+              <a:rPr lang="fr-FR" dirty="0"/>
               <a:t>).</a:t>
             </a:r>
-            <a:endParaRPr lang="fr-FR" dirty="0" smtClean="0"/>
-          </a:p>
-          <a:p>
-            <a:r>
-              <a:rPr lang="fr-FR" i="1" dirty="0" smtClean="0"/>
+          </a:p>
+          <a:p>
+            <a:r>
+              <a:rPr lang="fr-FR" i="1" dirty="0"/>
               <a:t>Selon le mode de fonctionnement, certains éléments ne sont pas accessibles.</a:t>
             </a:r>
-            <a:endParaRPr lang="fr-FR" i="1" dirty="0" smtClean="0"/>
           </a:p>
           <a:p>
             <a:endParaRPr lang="fr-FR" dirty="0"/>
           </a:p>
           <a:p>
-            <a:endParaRPr lang="fr-FR" dirty="0" smtClean="0"/>
+            <a:endParaRPr lang="fr-FR" dirty="0"/>
           </a:p>
         </p:txBody>
       </p:sp>
@@ -10598,7 +10198,6 @@
               <a:rPr lang="fr-FR" dirty="0"/>
               <a:t>Il est ainsi possible de modifier les paramètres d’acquisition de la caméra, de charger des mires sur le DMD ou de déplacer l’objectif par micro-déplacement à l’aide du système piézo-électrique.</a:t>
             </a:r>
-            <a:endParaRPr lang="fr-FR" dirty="0"/>
           </a:p>
         </p:txBody>
       </p:sp>
@@ -10631,25 +10230,8 @@
                   </a:schemeClr>
                 </a:solidFill>
               </a:rPr>
-              <a:t>MODE </a:t>
-            </a:r>
-            <a:r>
-              <a:rPr lang="fr-FR" b="1" dirty="0" smtClean="0">
-                <a:solidFill>
-                  <a:schemeClr val="accent6">
-                    <a:lumMod val="75000"/>
-                  </a:schemeClr>
-                </a:solidFill>
-              </a:rPr>
-              <a:t>AUTOMATIQUE</a:t>
-            </a:r>
-            <a:endParaRPr lang="fr-FR" b="1" dirty="0">
-              <a:solidFill>
-                <a:schemeClr val="accent6">
-                  <a:lumMod val="75000"/>
-                </a:schemeClr>
-              </a:solidFill>
-            </a:endParaRPr>
+              <a:t>MODE AUTOMATIQUE</a:t>
+            </a:r>
           </a:p>
           <a:p>
             <a:endParaRPr lang="fr-FR" dirty="0"/>
@@ -10661,21 +10243,12 @@
             </a:r>
             <a:r>
               <a:rPr lang="fr-FR" b="1" dirty="0"/>
-              <a:t>mode </a:t>
-            </a:r>
-            <a:r>
-              <a:rPr lang="fr-FR" b="1" dirty="0" smtClean="0"/>
-              <a:t>automatique </a:t>
-            </a:r>
-            <a:r>
-              <a:rPr lang="fr-FR" dirty="0"/>
-              <a:t>permet de </a:t>
-            </a:r>
-            <a:r>
-              <a:rPr lang="fr-FR" dirty="0" smtClean="0"/>
-              <a:t>lancer une acquisition d’une série d’images.</a:t>
-            </a:r>
-            <a:endParaRPr lang="fr-FR" dirty="0"/>
+              <a:t>mode automatique </a:t>
+            </a:r>
+            <a:r>
+              <a:rPr lang="fr-FR" dirty="0"/>
+              <a:t>permet de lancer une acquisition d’une série d’images.</a:t>
+            </a:r>
           </a:p>
         </p:txBody>
       </p:sp>
@@ -10936,7 +10509,7 @@
           <a:p>
             <a:pPr algn="ctr"/>
             <a:r>
-              <a:rPr lang="fr-FR" sz="2000" b="1" dirty="0" smtClean="0">
+              <a:rPr lang="fr-FR" sz="2000" b="1" dirty="0">
                 <a:solidFill>
                   <a:schemeClr val="tx1">
                     <a:lumMod val="65000"/>
@@ -10946,14 +10519,6 @@
               </a:rPr>
               <a:t>Microscope à Illumination Structurée</a:t>
             </a:r>
-            <a:endParaRPr lang="fr-FR" sz="2000" b="1" dirty="0">
-              <a:solidFill>
-                <a:schemeClr val="tx1">
-                  <a:lumMod val="65000"/>
-                  <a:lumOff val="35000"/>
-                </a:schemeClr>
-              </a:solidFill>
-            </a:endParaRPr>
           </a:p>
         </p:txBody>
       </p:sp>
@@ -11016,7 +10581,7 @@
           <a:p>
             <a:pPr algn="r"/>
             <a:r>
-              <a:rPr lang="fr-FR" sz="2000" b="1" dirty="0" smtClean="0">
+              <a:rPr lang="fr-FR" sz="2000" b="1" dirty="0">
                 <a:solidFill>
                   <a:schemeClr val="accent4">
                     <a:lumMod val="75000"/>
@@ -11025,13 +10590,6 @@
               </a:rPr>
               <a:t>Sélection du répertoire des données</a:t>
             </a:r>
-            <a:endParaRPr lang="fr-FR" sz="2000" b="1" dirty="0">
-              <a:solidFill>
-                <a:schemeClr val="accent4">
-                  <a:lumMod val="75000"/>
-                </a:schemeClr>
-              </a:solidFill>
-            </a:endParaRPr>
           </a:p>
         </p:txBody>
       </p:sp>
@@ -11058,33 +10616,32 @@
           <a:lstStyle/>
           <a:p>
             <a:r>
-              <a:rPr lang="fr-FR" dirty="0" smtClean="0"/>
+              <a:rPr lang="fr-FR" dirty="0"/>
               <a:t>Le bouton </a:t>
             </a:r>
             <a:r>
-              <a:rPr lang="fr-FR" b="1" i="1" dirty="0" smtClean="0"/>
+              <a:rPr lang="fr-FR" b="1" i="1" dirty="0"/>
               <a:t>Directory</a:t>
             </a:r>
             <a:r>
-              <a:rPr lang="fr-FR" dirty="0" smtClean="0"/>
+              <a:rPr lang="fr-FR" dirty="0"/>
               <a:t> (</a:t>
             </a:r>
             <a:r>
-              <a:rPr lang="fr-FR" b="1" dirty="0" smtClean="0"/>
+              <a:rPr lang="fr-FR" b="1" dirty="0"/>
               <a:t>2</a:t>
             </a:r>
             <a:r>
-              <a:rPr lang="fr-FR" dirty="0" smtClean="0"/>
+              <a:rPr lang="fr-FR" dirty="0"/>
               <a:t>) permet de sélectionner le répertoire dans lequel les données seront stockées.</a:t>
             </a:r>
-            <a:endParaRPr lang="fr-FR" dirty="0" smtClean="0"/>
-          </a:p>
-          <a:p>
-            <a:endParaRPr lang="fr-FR" dirty="0" smtClean="0"/>
-          </a:p>
-          <a:p>
-            <a:r>
-              <a:rPr lang="fr-FR" dirty="0" smtClean="0"/>
+          </a:p>
+          <a:p>
+            <a:endParaRPr lang="fr-FR" dirty="0"/>
+          </a:p>
+          <a:p>
+            <a:r>
+              <a:rPr lang="fr-FR" dirty="0"/>
               <a:t>Ce répertoire sert pour les deux modes de fonctionnement.</a:t>
             </a:r>
           </a:p>
@@ -11093,16 +10650,15 @@
           </a:p>
           <a:p>
             <a:r>
-              <a:rPr lang="fr-FR" dirty="0" smtClean="0"/>
+              <a:rPr lang="fr-FR" dirty="0"/>
               <a:t>Par défaut, le répertoire est le répertoire de l’application. </a:t>
             </a:r>
           </a:p>
           <a:p>
             <a:r>
-              <a:rPr lang="fr-FR" b="1" dirty="0" smtClean="0"/>
+              <a:rPr lang="fr-FR" b="1" dirty="0"/>
               <a:t>Pensez à modifier ce répertoire dès le lancement de l’application.</a:t>
             </a:r>
-            <a:endParaRPr lang="fr-FR" b="1" dirty="0" smtClean="0"/>
           </a:p>
         </p:txBody>
       </p:sp>
@@ -11165,7 +10721,7 @@
           <a:p>
             <a:pPr algn="r"/>
             <a:r>
-              <a:rPr lang="fr-FR" sz="2000" b="1" dirty="0" smtClean="0">
+              <a:rPr lang="fr-FR" sz="2000" b="1" dirty="0">
                 <a:solidFill>
                   <a:schemeClr val="accent4">
                     <a:lumMod val="75000"/>
@@ -11174,13 +10730,6 @@
               </a:rPr>
               <a:t>Sauvegarde de l’image en cours</a:t>
             </a:r>
-            <a:endParaRPr lang="fr-FR" sz="2000" b="1" dirty="0">
-              <a:solidFill>
-                <a:schemeClr val="accent4">
-                  <a:lumMod val="75000"/>
-                </a:schemeClr>
-              </a:solidFill>
-            </a:endParaRPr>
           </a:p>
         </p:txBody>
       </p:sp>
@@ -11207,15 +10756,15 @@
           <a:lstStyle/>
           <a:p>
             <a:r>
-              <a:rPr lang="fr-FR" dirty="0" smtClean="0"/>
+              <a:rPr lang="fr-FR" dirty="0"/>
               <a:t>Le bouton </a:t>
             </a:r>
             <a:r>
-              <a:rPr lang="fr-FR" b="1" i="1" dirty="0" smtClean="0"/>
+              <a:rPr lang="fr-FR" b="1" i="1" dirty="0"/>
               <a:t>Save</a:t>
             </a:r>
             <a:r>
-              <a:rPr lang="fr-FR" dirty="0" smtClean="0"/>
+              <a:rPr lang="fr-FR" dirty="0"/>
               <a:t> (</a:t>
             </a:r>
             <a:r>
@@ -11223,10 +10772,9 @@
               <a:t>3</a:t>
             </a:r>
             <a:r>
-              <a:rPr lang="fr-FR" dirty="0" smtClean="0"/>
+              <a:rPr lang="fr-FR" dirty="0"/>
               <a:t>) permet de sauvegarde l’image affichée sur l’interface par la caméra.</a:t>
             </a:r>
-            <a:endParaRPr lang="fr-FR" dirty="0" smtClean="0"/>
           </a:p>
         </p:txBody>
       </p:sp>
@@ -11283,10 +10831,9 @@
           <a:lstStyle/>
           <a:p>
             <a:r>
-              <a:rPr lang="fr-FR" sz="3200" dirty="0" smtClean="0"/>
+              <a:rPr lang="fr-FR" sz="3200" dirty="0"/>
               <a:t>Guide Utilisateur Interface</a:t>
             </a:r>
-            <a:endParaRPr lang="fr-FR" sz="3200" dirty="0"/>
           </a:p>
         </p:txBody>
       </p:sp>
@@ -11385,7 +10932,7 @@
           <a:p>
             <a:pPr algn="ctr"/>
             <a:r>
-              <a:rPr lang="fr-FR" sz="2000" b="1" dirty="0" smtClean="0">
+              <a:rPr lang="fr-FR" sz="2000" b="1" dirty="0">
                 <a:solidFill>
                   <a:schemeClr val="tx1">
                     <a:lumMod val="65000"/>
@@ -11395,14 +10942,6 @@
               </a:rPr>
               <a:t>Microscope à Illumination Structurée</a:t>
             </a:r>
-            <a:endParaRPr lang="fr-FR" sz="2000" b="1" dirty="0">
-              <a:solidFill>
-                <a:schemeClr val="tx1">
-                  <a:lumMod val="65000"/>
-                  <a:lumOff val="35000"/>
-                </a:schemeClr>
-              </a:solidFill>
-            </a:endParaRPr>
           </a:p>
         </p:txBody>
       </p:sp>
@@ -11465,7 +11004,7 @@
           <a:p>
             <a:pPr algn="ctr"/>
             <a:r>
-              <a:rPr lang="fr-FR" sz="1100" dirty="0" smtClean="0">
+              <a:rPr lang="fr-FR" sz="1100" dirty="0">
                 <a:solidFill>
                   <a:schemeClr val="tx1">
                     <a:lumMod val="65000"/>
@@ -11475,14 +11014,6 @@
               </a:rPr>
               <a:t>Interface réalisée par Romain Etienne / Promo 2025 – juin 2023</a:t>
             </a:r>
-            <a:endParaRPr lang="fr-FR" sz="1100" dirty="0">
-              <a:solidFill>
-                <a:schemeClr val="tx1">
-                  <a:lumMod val="65000"/>
-                  <a:lumOff val="35000"/>
-                </a:schemeClr>
-              </a:solidFill>
-            </a:endParaRPr>
           </a:p>
         </p:txBody>
       </p:sp>
@@ -11525,7 +11056,7 @@
           </a:lstStyle>
           <a:p>
             <a:r>
-              <a:rPr lang="fr-FR" sz="2400" b="1" dirty="0" smtClean="0">
+              <a:rPr lang="fr-FR" sz="2400" b="1" dirty="0">
                 <a:solidFill>
                   <a:schemeClr val="accent6">
                     <a:lumMod val="75000"/>
@@ -11534,13 +11065,6 @@
               </a:rPr>
               <a:t>Pilotage de la caméra</a:t>
             </a:r>
-            <a:endParaRPr lang="fr-FR" sz="2400" b="1" dirty="0">
-              <a:solidFill>
-                <a:schemeClr val="accent6">
-                  <a:lumMod val="75000"/>
-                </a:schemeClr>
-              </a:solidFill>
-            </a:endParaRPr>
           </a:p>
         </p:txBody>
       </p:sp>

</xml_diff>